<commit_message>
Improvements to training algorithm and some math explained.
</commit_message>
<xml_diff>
--- a/PizzaML/Pictures.pptx
+++ b/PizzaML/Pictures.pptx
@@ -7,6 +7,7 @@
   <p:sldIdLst>
     <p:sldId id="256" r:id="rId2"/>
     <p:sldId id="257" r:id="rId3"/>
+    <p:sldId id="258" r:id="rId4"/>
   </p:sldIdLst>
   <p:sldSz cx="12192000" cy="6858000"/>
   <p:notesSz cx="6858000" cy="9144000"/>
@@ -105,6 +106,11 @@
       </a:defRPr>
     </a:lvl9pPr>
   </p:defaultTextStyle>
+  <p:extLst>
+    <p:ext uri="{EFAFB233-063F-42B5-8137-9DF3F51BA10A}">
+      <p15:sldGuideLst xmlns:p15="http://schemas.microsoft.com/office/powerpoint/2012/main"/>
+    </p:ext>
+  </p:extLst>
 </p:presentation>
 </file>
 
@@ -257,7 +263,7 @@
           <a:p>
             <a:fld id="{C5464B4B-3537-D940-99E2-E97CDBD24873}" type="datetimeFigureOut">
               <a:rPr lang="fi-FI" smtClean="0"/>
-              <a:t>4.12.2019</a:t>
+              <a:t>11.12.2019</a:t>
             </a:fld>
             <a:endParaRPr lang="fi-FI"/>
           </a:p>
@@ -457,7 +463,7 @@
           <a:p>
             <a:fld id="{C5464B4B-3537-D940-99E2-E97CDBD24873}" type="datetimeFigureOut">
               <a:rPr lang="fi-FI" smtClean="0"/>
-              <a:t>4.12.2019</a:t>
+              <a:t>11.12.2019</a:t>
             </a:fld>
             <a:endParaRPr lang="fi-FI"/>
           </a:p>
@@ -667,7 +673,7 @@
           <a:p>
             <a:fld id="{C5464B4B-3537-D940-99E2-E97CDBD24873}" type="datetimeFigureOut">
               <a:rPr lang="fi-FI" smtClean="0"/>
-              <a:t>4.12.2019</a:t>
+              <a:t>11.12.2019</a:t>
             </a:fld>
             <a:endParaRPr lang="fi-FI"/>
           </a:p>
@@ -867,7 +873,7 @@
           <a:p>
             <a:fld id="{C5464B4B-3537-D940-99E2-E97CDBD24873}" type="datetimeFigureOut">
               <a:rPr lang="fi-FI" smtClean="0"/>
-              <a:t>4.12.2019</a:t>
+              <a:t>11.12.2019</a:t>
             </a:fld>
             <a:endParaRPr lang="fi-FI"/>
           </a:p>
@@ -1143,7 +1149,7 @@
           <a:p>
             <a:fld id="{C5464B4B-3537-D940-99E2-E97CDBD24873}" type="datetimeFigureOut">
               <a:rPr lang="fi-FI" smtClean="0"/>
-              <a:t>4.12.2019</a:t>
+              <a:t>11.12.2019</a:t>
             </a:fld>
             <a:endParaRPr lang="fi-FI"/>
           </a:p>
@@ -1411,7 +1417,7 @@
           <a:p>
             <a:fld id="{C5464B4B-3537-D940-99E2-E97CDBD24873}" type="datetimeFigureOut">
               <a:rPr lang="fi-FI" smtClean="0"/>
-              <a:t>4.12.2019</a:t>
+              <a:t>11.12.2019</a:t>
             </a:fld>
             <a:endParaRPr lang="fi-FI"/>
           </a:p>
@@ -1826,7 +1832,7 @@
           <a:p>
             <a:fld id="{C5464B4B-3537-D940-99E2-E97CDBD24873}" type="datetimeFigureOut">
               <a:rPr lang="fi-FI" smtClean="0"/>
-              <a:t>4.12.2019</a:t>
+              <a:t>11.12.2019</a:t>
             </a:fld>
             <a:endParaRPr lang="fi-FI"/>
           </a:p>
@@ -1968,7 +1974,7 @@
           <a:p>
             <a:fld id="{C5464B4B-3537-D940-99E2-E97CDBD24873}" type="datetimeFigureOut">
               <a:rPr lang="fi-FI" smtClean="0"/>
-              <a:t>4.12.2019</a:t>
+              <a:t>11.12.2019</a:t>
             </a:fld>
             <a:endParaRPr lang="fi-FI"/>
           </a:p>
@@ -2081,7 +2087,7 @@
           <a:p>
             <a:fld id="{C5464B4B-3537-D940-99E2-E97CDBD24873}" type="datetimeFigureOut">
               <a:rPr lang="fi-FI" smtClean="0"/>
-              <a:t>4.12.2019</a:t>
+              <a:t>11.12.2019</a:t>
             </a:fld>
             <a:endParaRPr lang="fi-FI"/>
           </a:p>
@@ -2394,7 +2400,7 @@
           <a:p>
             <a:fld id="{C5464B4B-3537-D940-99E2-E97CDBD24873}" type="datetimeFigureOut">
               <a:rPr lang="fi-FI" smtClean="0"/>
-              <a:t>4.12.2019</a:t>
+              <a:t>11.12.2019</a:t>
             </a:fld>
             <a:endParaRPr lang="fi-FI"/>
           </a:p>
@@ -2683,7 +2689,7 @@
           <a:p>
             <a:fld id="{C5464B4B-3537-D940-99E2-E97CDBD24873}" type="datetimeFigureOut">
               <a:rPr lang="fi-FI" smtClean="0"/>
-              <a:t>4.12.2019</a:t>
+              <a:t>11.12.2019</a:t>
             </a:fld>
             <a:endParaRPr lang="fi-FI"/>
           </a:p>
@@ -2926,7 +2932,7 @@
           <a:p>
             <a:fld id="{C5464B4B-3537-D940-99E2-E97CDBD24873}" type="datetimeFigureOut">
               <a:rPr lang="fi-FI" smtClean="0"/>
-              <a:t>4.12.2019</a:t>
+              <a:t>11.12.2019</a:t>
             </a:fld>
             <a:endParaRPr lang="fi-FI"/>
           </a:p>
@@ -3864,8 +3870,8 @@
             </p:nvSpPr>
             <p:spPr>
               <a:xfrm>
-                <a:off x="3121435" y="3104681"/>
-                <a:ext cx="5949129" cy="648639"/>
+                <a:off x="3107148" y="490068"/>
+                <a:ext cx="6244145" cy="648639"/>
               </a:xfrm>
               <a:prstGeom prst="rect">
                 <a:avLst/>
@@ -3877,6 +3883,7 @@
               </a:bodyPr>
               <a:lstStyle/>
               <a:p>
+                <a:pPr/>
                 <a14:m>
                   <m:oMathPara xmlns:m="http://schemas.openxmlformats.org/officeDocument/2006/math">
                     <m:oMathParaPr>
@@ -4250,39 +4257,373 @@
                                   <m:d>
                                     <m:dPr>
                                       <m:ctrlPr>
-                                        <a:rPr lang="fi-FI" i="1">
+                                        <a:rPr lang="fi-FI" b="0" i="1" smtClean="0">
                                           <a:latin typeface="Cambria Math" panose="02040503050406030204" pitchFamily="18" charset="0"/>
                                         </a:rPr>
                                       </m:ctrlPr>
                                     </m:dPr>
                                     <m:e>
-                                      <m:sSub>
-                                        <m:sSubPr>
+                                      <m:sSup>
+                                        <m:sSupPr>
+                                          <m:ctrlPr>
+                                            <a:rPr lang="fi-FI" b="0" i="1" smtClean="0">
+                                              <a:latin typeface="Cambria Math" panose="02040503050406030204" pitchFamily="18" charset="0"/>
+                                            </a:rPr>
+                                          </m:ctrlPr>
+                                        </m:sSupPr>
+                                        <m:e>
+                                          <m:r>
+                                            <a:rPr lang="fi-FI" b="0" i="1" smtClean="0">
+                                              <a:latin typeface="Cambria Math" panose="02040503050406030204" pitchFamily="18" charset="0"/>
+                                            </a:rPr>
+                                            <m:t>𝑥</m:t>
+                                          </m:r>
+                                        </m:e>
+                                        <m:sup>
+                                          <m:d>
+                                            <m:dPr>
+                                              <m:ctrlPr>
+                                                <a:rPr lang="fi-FI" b="0" i="1" smtClean="0">
+                                                  <a:latin typeface="Cambria Math" panose="02040503050406030204" pitchFamily="18" charset="0"/>
+                                                </a:rPr>
+                                              </m:ctrlPr>
+                                            </m:dPr>
+                                            <m:e>
+                                              <m:r>
+                                                <a:rPr lang="fi-FI" b="0" i="1" smtClean="0">
+                                                  <a:latin typeface="Cambria Math" panose="02040503050406030204" pitchFamily="18" charset="0"/>
+                                                </a:rPr>
+                                                <m:t>𝑖</m:t>
+                                              </m:r>
+                                            </m:e>
+                                          </m:d>
+                                        </m:sup>
+                                      </m:sSup>
+                                    </m:e>
+                                  </m:d>
+                                  <m:r>
+                                    <a:rPr lang="fi-FI" b="0" i="1" smtClean="0">
+                                      <a:latin typeface="Cambria Math" panose="02040503050406030204" pitchFamily="18" charset="0"/>
+                                    </a:rPr>
+                                    <m:t>−</m:t>
+                                  </m:r>
+                                  <m:sSup>
+                                    <m:sSupPr>
+                                      <m:ctrlPr>
+                                        <a:rPr lang="fi-FI" b="0" i="1" smtClean="0">
+                                          <a:latin typeface="Cambria Math" panose="02040503050406030204" pitchFamily="18" charset="0"/>
+                                        </a:rPr>
+                                      </m:ctrlPr>
+                                    </m:sSupPr>
+                                    <m:e>
+                                      <m:r>
+                                        <a:rPr lang="fi-FI" b="0" i="1" smtClean="0">
+                                          <a:latin typeface="Cambria Math" panose="02040503050406030204" pitchFamily="18" charset="0"/>
+                                        </a:rPr>
+                                        <m:t>𝑦</m:t>
+                                      </m:r>
+                                    </m:e>
+                                    <m:sup>
+                                      <m:r>
+                                        <a:rPr lang="fi-FI" b="0" i="1" smtClean="0">
+                                          <a:latin typeface="Cambria Math" panose="02040503050406030204" pitchFamily="18" charset="0"/>
+                                        </a:rPr>
+                                        <m:t>(</m:t>
+                                      </m:r>
+                                      <m:r>
+                                        <a:rPr lang="fi-FI" b="0" i="1" smtClean="0">
+                                          <a:latin typeface="Cambria Math" panose="02040503050406030204" pitchFamily="18" charset="0"/>
+                                        </a:rPr>
+                                        <m:t>𝑖</m:t>
+                                      </m:r>
+                                      <m:r>
+                                        <a:rPr lang="fi-FI" b="0" i="1" smtClean="0">
+                                          <a:latin typeface="Cambria Math" panose="02040503050406030204" pitchFamily="18" charset="0"/>
+                                        </a:rPr>
+                                        <m:t>)</m:t>
+                                      </m:r>
+                                    </m:sup>
+                                  </m:sSup>
+                                </m:e>
+                              </m:d>
+                            </m:e>
+                            <m:sup>
+                              <m:r>
+                                <a:rPr lang="fi-FI" i="0">
+                                  <a:latin typeface="Cambria Math" panose="02040503050406030204" pitchFamily="18" charset="0"/>
+                                </a:rPr>
+                                <m:t>2</m:t>
+                              </m:r>
+                            </m:sup>
+                          </m:sSup>
+                        </m:e>
+                      </m:nary>
+                    </m:oMath>
+                  </m:oMathPara>
+                </a14:m>
+                <a:endParaRPr lang="fi-FI" dirty="0"/>
+              </a:p>
+            </p:txBody>
+          </p:sp>
+        </mc:Choice>
+        <mc:Fallback>
+          <p:sp>
+            <p:nvSpPr>
+              <p:cNvPr id="2" name="Rectangle 1">
+                <a:extLst>
+                  <a:ext uri="{FF2B5EF4-FFF2-40B4-BE49-F238E27FC236}">
+                    <a16:creationId xmlns:a16="http://schemas.microsoft.com/office/drawing/2014/main" id="{FC23F8E0-E7AF-5F44-8E09-A0E95B2D4F3C}"/>
+                  </a:ext>
+                </a:extLst>
+              </p:cNvPr>
+              <p:cNvSpPr>
+                <a:spLocks noRot="1" noChangeAspect="1" noMove="1" noResize="1" noEditPoints="1" noAdjustHandles="1" noChangeArrowheads="1" noChangeShapeType="1" noTextEdit="1"/>
+              </p:cNvSpPr>
+              <p:nvPr/>
+            </p:nvSpPr>
+            <p:spPr>
+              <a:xfrm>
+                <a:off x="3107148" y="490068"/>
+                <a:ext cx="6244145" cy="648639"/>
+              </a:xfrm>
+              <a:prstGeom prst="rect">
+                <a:avLst/>
+              </a:prstGeom>
+              <a:blipFill>
+                <a:blip r:embed="rId2"/>
+                <a:stretch>
+                  <a:fillRect t="-142308" b="-213462"/>
+                </a:stretch>
+              </a:blipFill>
+            </p:spPr>
+            <p:txBody>
+              <a:bodyPr/>
+              <a:lstStyle/>
+              <a:p>
+                <a:r>
+                  <a:rPr lang="fi-FI">
+                    <a:noFill/>
+                  </a:rPr>
+                  <a:t> </a:t>
+                </a:r>
+              </a:p>
+            </p:txBody>
+          </p:sp>
+        </mc:Fallback>
+      </mc:AlternateContent>
+      <mc:AlternateContent xmlns:mc="http://schemas.openxmlformats.org/markup-compatibility/2006">
+        <mc:Choice xmlns:a14="http://schemas.microsoft.com/office/drawing/2010/main" Requires="a14">
+          <p:sp>
+            <p:nvSpPr>
+              <p:cNvPr id="4" name="Rectangle 3">
+                <a:extLst>
+                  <a:ext uri="{FF2B5EF4-FFF2-40B4-BE49-F238E27FC236}">
+                    <a16:creationId xmlns:a16="http://schemas.microsoft.com/office/drawing/2014/main" id="{5788F5FC-309E-D04D-A086-CF53BADB6A01}"/>
+                  </a:ext>
+                </a:extLst>
+              </p:cNvPr>
+              <p:cNvSpPr/>
+              <p:nvPr/>
+            </p:nvSpPr>
+            <p:spPr>
+              <a:xfrm>
+                <a:off x="3216686" y="1628306"/>
+                <a:ext cx="5761770" cy="648639"/>
+              </a:xfrm>
+              <a:prstGeom prst="rect">
+                <a:avLst/>
+              </a:prstGeom>
+            </p:spPr>
+            <p:txBody>
+              <a:bodyPr wrap="none">
+                <a:spAutoFit/>
+              </a:bodyPr>
+              <a:lstStyle/>
+              <a:p>
+                <a:pPr/>
+                <a14:m>
+                  <m:oMathPara xmlns:m="http://schemas.openxmlformats.org/officeDocument/2006/math">
+                    <m:oMathParaPr>
+                      <m:jc m:val="centerGroup"/>
+                    </m:oMathParaPr>
+                    <m:oMath xmlns:m="http://schemas.openxmlformats.org/officeDocument/2006/math">
+                      <m:r>
+                        <a:rPr lang="fi-FI" i="1" smtClean="0">
+                          <a:latin typeface="Cambria Math" panose="02040503050406030204" pitchFamily="18" charset="0"/>
+                        </a:rPr>
+                        <m:t>𝐽</m:t>
+                      </m:r>
+                      <m:d>
+                        <m:dPr>
+                          <m:ctrlPr>
+                            <a:rPr lang="fi-FI" i="1">
+                              <a:latin typeface="Cambria Math" panose="02040503050406030204" pitchFamily="18" charset="0"/>
+                            </a:rPr>
+                          </m:ctrlPr>
+                        </m:dPr>
+                        <m:e>
+                          <m:sSub>
+                            <m:sSubPr>
+                              <m:ctrlPr>
+                                <a:rPr lang="fi-FI" i="1">
+                                  <a:latin typeface="Cambria Math" panose="02040503050406030204" pitchFamily="18" charset="0"/>
+                                </a:rPr>
+                              </m:ctrlPr>
+                            </m:sSubPr>
+                            <m:e>
+                              <m:r>
+                                <m:rPr>
+                                  <m:sty m:val="p"/>
+                                </m:rPr>
+                                <a:rPr lang="fi-FI" i="0">
+                                  <a:latin typeface="Cambria Math" panose="02040503050406030204" pitchFamily="18" charset="0"/>
+                                </a:rPr>
+                                <m:t>θ</m:t>
+                              </m:r>
+                            </m:e>
+                            <m:sub>
+                              <m:r>
+                                <a:rPr lang="fi-FI" b="0" i="0" smtClean="0">
+                                  <a:latin typeface="Cambria Math" panose="02040503050406030204" pitchFamily="18" charset="0"/>
+                                </a:rPr>
+                                <m:t>1</m:t>
+                              </m:r>
+                            </m:sub>
+                          </m:sSub>
+                          <m:r>
+                            <a:rPr lang="fi-FI" i="1" smtClean="0">
+                              <a:latin typeface="Cambria Math" panose="02040503050406030204" pitchFamily="18" charset="0"/>
+                            </a:rPr>
+                            <m:t> </m:t>
+                          </m:r>
+                        </m:e>
+                      </m:d>
+                      <m:r>
+                        <a:rPr lang="fi-FI" i="0">
+                          <a:latin typeface="Cambria Math" panose="02040503050406030204" pitchFamily="18" charset="0"/>
+                        </a:rPr>
+                        <m:t>=</m:t>
+                      </m:r>
+                      <m:f>
+                        <m:fPr>
+                          <m:ctrlPr>
+                            <a:rPr lang="fi-FI" i="1">
+                              <a:latin typeface="Cambria Math" panose="02040503050406030204" pitchFamily="18" charset="0"/>
+                            </a:rPr>
+                          </m:ctrlPr>
+                        </m:fPr>
+                        <m:num>
+                          <m:r>
+                            <a:rPr lang="fi-FI" i="0">
+                              <a:latin typeface="Cambria Math" panose="02040503050406030204" pitchFamily="18" charset="0"/>
+                            </a:rPr>
+                            <m:t>1</m:t>
+                          </m:r>
+                        </m:num>
+                        <m:den>
+                          <m:r>
+                            <a:rPr lang="fi-FI" i="0">
+                              <a:latin typeface="Cambria Math" panose="02040503050406030204" pitchFamily="18" charset="0"/>
+                            </a:rPr>
+                            <m:t>2</m:t>
+                          </m:r>
+                          <m:r>
+                            <a:rPr lang="fi-FI" i="1">
+                              <a:latin typeface="Cambria Math" panose="02040503050406030204" pitchFamily="18" charset="0"/>
+                            </a:rPr>
+                            <m:t>𝑚</m:t>
+                          </m:r>
+                        </m:den>
+                      </m:f>
+                      <m:nary>
+                        <m:naryPr>
+                          <m:chr m:val="∑"/>
+                          <m:limLoc m:val="subSup"/>
+                          <m:grow m:val="on"/>
+                          <m:ctrlPr>
+                            <a:rPr lang="fi-FI" i="1">
+                              <a:latin typeface="Cambria Math" panose="02040503050406030204" pitchFamily="18" charset="0"/>
+                            </a:rPr>
+                          </m:ctrlPr>
+                        </m:naryPr>
+                        <m:sub>
+                          <m:r>
+                            <a:rPr lang="fi-FI" i="1">
+                              <a:latin typeface="Cambria Math" panose="02040503050406030204" pitchFamily="18" charset="0"/>
+                            </a:rPr>
+                            <m:t>𝑖</m:t>
+                          </m:r>
+                          <m:r>
+                            <a:rPr lang="fi-FI" i="0">
+                              <a:latin typeface="Cambria Math" panose="02040503050406030204" pitchFamily="18" charset="0"/>
+                            </a:rPr>
+                            <m:t>=1</m:t>
+                          </m:r>
+                        </m:sub>
+                        <m:sup>
+                          <m:r>
+                            <a:rPr lang="fi-FI" i="1">
+                              <a:latin typeface="Cambria Math" panose="02040503050406030204" pitchFamily="18" charset="0"/>
+                            </a:rPr>
+                            <m:t>𝑚</m:t>
+                          </m:r>
+                        </m:sup>
+                        <m:e>
+                          <m:sSup>
+                            <m:sSupPr>
+                              <m:ctrlPr>
+                                <a:rPr lang="fi-FI" i="1">
+                                  <a:latin typeface="Cambria Math" panose="02040503050406030204" pitchFamily="18" charset="0"/>
+                                </a:rPr>
+                              </m:ctrlPr>
+                            </m:sSupPr>
+                            <m:e>
+                              <m:d>
+                                <m:dPr>
+                                  <m:ctrlPr>
+                                    <a:rPr lang="fi-FI" i="1">
+                                      <a:latin typeface="Cambria Math" panose="02040503050406030204" pitchFamily="18" charset="0"/>
+                                    </a:rPr>
+                                  </m:ctrlPr>
+                                </m:dPr>
+                                <m:e>
+                                  <m:sSub>
+                                    <m:sSubPr>
+                                      <m:ctrlPr>
+                                        <a:rPr lang="fi-FI" i="1">
+                                          <a:latin typeface="Cambria Math" panose="02040503050406030204" pitchFamily="18" charset="0"/>
+                                        </a:rPr>
+                                      </m:ctrlPr>
+                                    </m:sSubPr>
+                                    <m:e>
+                                      <m:acc>
+                                        <m:accPr>
+                                          <m:chr m:val="̂"/>
                                           <m:ctrlPr>
                                             <a:rPr lang="fi-FI" i="1">
                                               <a:latin typeface="Cambria Math" panose="02040503050406030204" pitchFamily="18" charset="0"/>
                                             </a:rPr>
                                           </m:ctrlPr>
-                                        </m:sSubPr>
+                                        </m:accPr>
                                         <m:e>
                                           <m:r>
                                             <a:rPr lang="fi-FI" i="1">
                                               <a:latin typeface="Cambria Math" panose="02040503050406030204" pitchFamily="18" charset="0"/>
                                             </a:rPr>
-                                            <m:t>𝑥</m:t>
+                                            <m:t>𝑦</m:t>
                                           </m:r>
                                         </m:e>
-                                        <m:sub>
-                                          <m:r>
-                                            <a:rPr lang="fi-FI" i="1">
-                                              <a:latin typeface="Cambria Math" panose="02040503050406030204" pitchFamily="18" charset="0"/>
-                                            </a:rPr>
-                                            <m:t>𝑖</m:t>
-                                          </m:r>
-                                        </m:sub>
-                                      </m:sSub>
+                                      </m:acc>
                                     </m:e>
-                                  </m:d>
+                                    <m:sub>
+                                      <m:r>
+                                        <a:rPr lang="fi-FI" i="1">
+                                          <a:latin typeface="Cambria Math" panose="02040503050406030204" pitchFamily="18" charset="0"/>
+                                        </a:rPr>
+                                        <m:t>𝑖</m:t>
+                                      </m:r>
+                                    </m:sub>
+                                  </m:sSub>
                                   <m:r>
                                     <a:rPr lang="fi-FI" i="0">
                                       <a:latin typeface="Cambria Math" panose="02040503050406030204" pitchFamily="18" charset="0"/>
@@ -4328,6 +4669,217 @@
                           </m:sSup>
                         </m:e>
                       </m:nary>
+                      <m:r>
+                        <a:rPr lang="fi-FI" i="0">
+                          <a:latin typeface="Cambria Math" panose="02040503050406030204" pitchFamily="18" charset="0"/>
+                        </a:rPr>
+                        <m:t>=</m:t>
+                      </m:r>
+                      <m:f>
+                        <m:fPr>
+                          <m:ctrlPr>
+                            <a:rPr lang="fi-FI" i="1">
+                              <a:latin typeface="Cambria Math" panose="02040503050406030204" pitchFamily="18" charset="0"/>
+                            </a:rPr>
+                          </m:ctrlPr>
+                        </m:fPr>
+                        <m:num>
+                          <m:r>
+                            <a:rPr lang="fi-FI" i="0">
+                              <a:latin typeface="Cambria Math" panose="02040503050406030204" pitchFamily="18" charset="0"/>
+                            </a:rPr>
+                            <m:t>1</m:t>
+                          </m:r>
+                        </m:num>
+                        <m:den>
+                          <m:r>
+                            <a:rPr lang="fi-FI" i="0">
+                              <a:latin typeface="Cambria Math" panose="02040503050406030204" pitchFamily="18" charset="0"/>
+                            </a:rPr>
+                            <m:t>2</m:t>
+                          </m:r>
+                          <m:r>
+                            <a:rPr lang="fi-FI" i="1">
+                              <a:latin typeface="Cambria Math" panose="02040503050406030204" pitchFamily="18" charset="0"/>
+                            </a:rPr>
+                            <m:t>𝑚</m:t>
+                          </m:r>
+                        </m:den>
+                      </m:f>
+                      <m:nary>
+                        <m:naryPr>
+                          <m:chr m:val="∑"/>
+                          <m:limLoc m:val="subSup"/>
+                          <m:grow m:val="on"/>
+                          <m:ctrlPr>
+                            <a:rPr lang="fi-FI" i="1">
+                              <a:latin typeface="Cambria Math" panose="02040503050406030204" pitchFamily="18" charset="0"/>
+                            </a:rPr>
+                          </m:ctrlPr>
+                        </m:naryPr>
+                        <m:sub>
+                          <m:r>
+                            <a:rPr lang="fi-FI" i="1">
+                              <a:latin typeface="Cambria Math" panose="02040503050406030204" pitchFamily="18" charset="0"/>
+                            </a:rPr>
+                            <m:t>𝑖</m:t>
+                          </m:r>
+                          <m:r>
+                            <a:rPr lang="fi-FI" i="0">
+                              <a:latin typeface="Cambria Math" panose="02040503050406030204" pitchFamily="18" charset="0"/>
+                            </a:rPr>
+                            <m:t>=1</m:t>
+                          </m:r>
+                        </m:sub>
+                        <m:sup>
+                          <m:r>
+                            <a:rPr lang="fi-FI" i="1">
+                              <a:latin typeface="Cambria Math" panose="02040503050406030204" pitchFamily="18" charset="0"/>
+                            </a:rPr>
+                            <m:t>𝑚</m:t>
+                          </m:r>
+                        </m:sup>
+                        <m:e>
+                          <m:sSup>
+                            <m:sSupPr>
+                              <m:ctrlPr>
+                                <a:rPr lang="fi-FI" i="1">
+                                  <a:latin typeface="Cambria Math" panose="02040503050406030204" pitchFamily="18" charset="0"/>
+                                </a:rPr>
+                              </m:ctrlPr>
+                            </m:sSupPr>
+                            <m:e>
+                              <m:d>
+                                <m:dPr>
+                                  <m:ctrlPr>
+                                    <a:rPr lang="fi-FI" i="1">
+                                      <a:latin typeface="Cambria Math" panose="02040503050406030204" pitchFamily="18" charset="0"/>
+                                    </a:rPr>
+                                  </m:ctrlPr>
+                                </m:dPr>
+                                <m:e>
+                                  <m:sSub>
+                                    <m:sSubPr>
+                                      <m:ctrlPr>
+                                        <a:rPr lang="fi-FI" i="1">
+                                          <a:latin typeface="Cambria Math" panose="02040503050406030204" pitchFamily="18" charset="0"/>
+                                        </a:rPr>
+                                      </m:ctrlPr>
+                                    </m:sSubPr>
+                                    <m:e>
+                                      <m:r>
+                                        <m:rPr>
+                                          <m:sty m:val="p"/>
+                                        </m:rPr>
+                                        <a:rPr lang="fi-FI">
+                                          <a:latin typeface="Cambria Math" panose="02040503050406030204" pitchFamily="18" charset="0"/>
+                                        </a:rPr>
+                                        <m:t>θ</m:t>
+                                      </m:r>
+                                    </m:e>
+                                    <m:sub>
+                                      <m:r>
+                                        <a:rPr lang="fi-FI">
+                                          <a:latin typeface="Cambria Math" panose="02040503050406030204" pitchFamily="18" charset="0"/>
+                                        </a:rPr>
+                                        <m:t>1</m:t>
+                                      </m:r>
+                                    </m:sub>
+                                  </m:sSub>
+                                  <m:sSup>
+                                    <m:sSupPr>
+                                      <m:ctrlPr>
+                                        <a:rPr lang="fi-FI" i="1" smtClean="0">
+                                          <a:latin typeface="Cambria Math" panose="02040503050406030204" pitchFamily="18" charset="0"/>
+                                        </a:rPr>
+                                      </m:ctrlPr>
+                                    </m:sSupPr>
+                                    <m:e>
+                                      <m:r>
+                                        <a:rPr lang="fi-FI" b="0" i="1" smtClean="0">
+                                          <a:latin typeface="Cambria Math" panose="02040503050406030204" pitchFamily="18" charset="0"/>
+                                        </a:rPr>
+                                        <m:t>𝑥</m:t>
+                                      </m:r>
+                                    </m:e>
+                                    <m:sup>
+                                      <m:r>
+                                        <a:rPr lang="fi-FI" b="0" i="1" smtClean="0">
+                                          <a:latin typeface="Cambria Math" panose="02040503050406030204" pitchFamily="18" charset="0"/>
+                                        </a:rPr>
+                                        <m:t>(</m:t>
+                                      </m:r>
+                                      <m:r>
+                                        <a:rPr lang="fi-FI" b="0" i="1" smtClean="0">
+                                          <a:latin typeface="Cambria Math" panose="02040503050406030204" pitchFamily="18" charset="0"/>
+                                        </a:rPr>
+                                        <m:t>𝑖</m:t>
+                                      </m:r>
+                                      <m:r>
+                                        <a:rPr lang="fi-FI" b="0" i="1" smtClean="0">
+                                          <a:latin typeface="Cambria Math" panose="02040503050406030204" pitchFamily="18" charset="0"/>
+                                        </a:rPr>
+                                        <m:t>)</m:t>
+                                      </m:r>
+                                    </m:sup>
+                                  </m:sSup>
+                                  <m:r>
+                                    <a:rPr lang="fi-FI" b="0" i="1" smtClean="0">
+                                      <a:latin typeface="Cambria Math" panose="02040503050406030204" pitchFamily="18" charset="0"/>
+                                    </a:rPr>
+                                    <m:t>−</m:t>
+                                  </m:r>
+                                  <m:sSup>
+                                    <m:sSupPr>
+                                      <m:ctrlPr>
+                                        <a:rPr lang="fi-FI" b="0" i="1" smtClean="0">
+                                          <a:latin typeface="Cambria Math" panose="02040503050406030204" pitchFamily="18" charset="0"/>
+                                        </a:rPr>
+                                      </m:ctrlPr>
+                                    </m:sSupPr>
+                                    <m:e>
+                                      <m:r>
+                                        <a:rPr lang="fi-FI" b="0" i="1" smtClean="0">
+                                          <a:latin typeface="Cambria Math" panose="02040503050406030204" pitchFamily="18" charset="0"/>
+                                        </a:rPr>
+                                        <m:t>𝑦</m:t>
+                                      </m:r>
+                                    </m:e>
+                                    <m:sup>
+                                      <m:r>
+                                        <a:rPr lang="fi-FI" b="0" i="1" smtClean="0">
+                                          <a:latin typeface="Cambria Math" panose="02040503050406030204" pitchFamily="18" charset="0"/>
+                                        </a:rPr>
+                                        <m:t>(</m:t>
+                                      </m:r>
+                                      <m:r>
+                                        <a:rPr lang="fi-FI" b="0" i="1" smtClean="0">
+                                          <a:latin typeface="Cambria Math" panose="02040503050406030204" pitchFamily="18" charset="0"/>
+                                        </a:rPr>
+                                        <m:t>𝑖</m:t>
+                                      </m:r>
+                                      <m:r>
+                                        <a:rPr lang="fi-FI" b="0" i="1" smtClean="0">
+                                          <a:latin typeface="Cambria Math" panose="02040503050406030204" pitchFamily="18" charset="0"/>
+                                        </a:rPr>
+                                        <m:t>)</m:t>
+                                      </m:r>
+                                    </m:sup>
+                                  </m:sSup>
+                                </m:e>
+                              </m:d>
+                            </m:e>
+                            <m:sup>
+                              <m:r>
+                                <a:rPr lang="fi-FI" i="0">
+                                  <a:latin typeface="Cambria Math" panose="02040503050406030204" pitchFamily="18" charset="0"/>
+                                </a:rPr>
+                                <m:t>2</m:t>
+                              </m:r>
+                            </m:sup>
+                          </m:sSup>
+                        </m:e>
+                      </m:nary>
                     </m:oMath>
                   </m:oMathPara>
                 </a14:m>
@@ -4339,10 +4891,10 @@
         <mc:Fallback>
           <p:sp>
             <p:nvSpPr>
-              <p:cNvPr id="2" name="Rectangle 1">
+              <p:cNvPr id="4" name="Rectangle 3">
                 <a:extLst>
                   <a:ext uri="{FF2B5EF4-FFF2-40B4-BE49-F238E27FC236}">
-                    <a16:creationId xmlns:a16="http://schemas.microsoft.com/office/drawing/2014/main" id="{FC23F8E0-E7AF-5F44-8E09-A0E95B2D4F3C}"/>
+                    <a16:creationId xmlns:a16="http://schemas.microsoft.com/office/drawing/2014/main" id="{5788F5FC-309E-D04D-A086-CF53BADB6A01}"/>
                   </a:ext>
                 </a:extLst>
               </p:cNvPr>
@@ -4353,16 +4905,508 @@
             </p:nvSpPr>
             <p:spPr>
               <a:xfrm>
-                <a:off x="3121435" y="3104681"/>
-                <a:ext cx="5949129" cy="648639"/>
+                <a:off x="3216686" y="1628306"/>
+                <a:ext cx="5761770" cy="648639"/>
               </a:xfrm>
               <a:prstGeom prst="rect">
                 <a:avLst/>
               </a:prstGeom>
               <a:blipFill>
-                <a:blip r:embed="rId2"/>
+                <a:blip r:embed="rId3"/>
                 <a:stretch>
-                  <a:fillRect t="-141509" b="-209434"/>
+                  <a:fillRect t="-144231" b="-213462"/>
+                </a:stretch>
+              </a:blipFill>
+            </p:spPr>
+            <p:txBody>
+              <a:bodyPr/>
+              <a:lstStyle/>
+              <a:p>
+                <a:r>
+                  <a:rPr lang="fi-FI">
+                    <a:noFill/>
+                  </a:rPr>
+                  <a:t> </a:t>
+                </a:r>
+              </a:p>
+            </p:txBody>
+          </p:sp>
+        </mc:Fallback>
+      </mc:AlternateContent>
+      <mc:AlternateContent xmlns:mc="http://schemas.openxmlformats.org/markup-compatibility/2006">
+        <mc:Choice xmlns:a14="http://schemas.microsoft.com/office/drawing/2010/main" Requires="a14">
+          <p:sp>
+            <p:nvSpPr>
+              <p:cNvPr id="6" name="Rectangle 5">
+                <a:extLst>
+                  <a:ext uri="{FF2B5EF4-FFF2-40B4-BE49-F238E27FC236}">
+                    <a16:creationId xmlns:a16="http://schemas.microsoft.com/office/drawing/2014/main" id="{DFBE6D0F-782D-D342-8DEA-DFFB800C88D6}"/>
+                  </a:ext>
+                </a:extLst>
+              </p:cNvPr>
+              <p:cNvSpPr/>
+              <p:nvPr/>
+            </p:nvSpPr>
+            <p:spPr>
+              <a:xfrm>
+                <a:off x="983073" y="3423769"/>
+                <a:ext cx="6182783" cy="648639"/>
+              </a:xfrm>
+              <a:prstGeom prst="rect">
+                <a:avLst/>
+              </a:prstGeom>
+            </p:spPr>
+            <p:txBody>
+              <a:bodyPr wrap="none">
+                <a:spAutoFit/>
+              </a:bodyPr>
+              <a:lstStyle/>
+              <a:p>
+                <a:pPr/>
+                <a14:m>
+                  <m:oMathPara xmlns:m="http://schemas.openxmlformats.org/officeDocument/2006/math">
+                    <m:oMathParaPr>
+                      <m:jc m:val="centerGroup"/>
+                    </m:oMathParaPr>
+                    <m:oMath xmlns:m="http://schemas.openxmlformats.org/officeDocument/2006/math">
+                      <m:r>
+                        <a:rPr lang="fi-FI" i="1" smtClean="0">
+                          <a:latin typeface="Cambria Math" panose="02040503050406030204" pitchFamily="18" charset="0"/>
+                        </a:rPr>
+                        <m:t>𝐽</m:t>
+                      </m:r>
+                      <m:d>
+                        <m:dPr>
+                          <m:ctrlPr>
+                            <a:rPr lang="fi-FI" i="1">
+                              <a:latin typeface="Cambria Math" panose="02040503050406030204" pitchFamily="18" charset="0"/>
+                            </a:rPr>
+                          </m:ctrlPr>
+                        </m:dPr>
+                        <m:e>
+                          <m:sSub>
+                            <m:sSubPr>
+                              <m:ctrlPr>
+                                <a:rPr lang="fi-FI" i="1">
+                                  <a:latin typeface="Cambria Math" panose="02040503050406030204" pitchFamily="18" charset="0"/>
+                                </a:rPr>
+                              </m:ctrlPr>
+                            </m:sSubPr>
+                            <m:e>
+                              <m:r>
+                                <m:rPr>
+                                  <m:sty m:val="p"/>
+                                </m:rPr>
+                                <a:rPr lang="fi-FI" i="0">
+                                  <a:latin typeface="Cambria Math" panose="02040503050406030204" pitchFamily="18" charset="0"/>
+                                </a:rPr>
+                                <m:t>θ</m:t>
+                              </m:r>
+                            </m:e>
+                            <m:sub>
+                              <m:r>
+                                <a:rPr lang="fi-FI" b="0" i="0" smtClean="0">
+                                  <a:latin typeface="Cambria Math" panose="02040503050406030204" pitchFamily="18" charset="0"/>
+                                </a:rPr>
+                                <m:t>1</m:t>
+                              </m:r>
+                            </m:sub>
+                          </m:sSub>
+                          <m:r>
+                            <a:rPr lang="fi-FI" i="1" smtClean="0">
+                              <a:latin typeface="Cambria Math" panose="02040503050406030204" pitchFamily="18" charset="0"/>
+                            </a:rPr>
+                            <m:t> </m:t>
+                          </m:r>
+                        </m:e>
+                      </m:d>
+                      <m:r>
+                        <a:rPr lang="fi-FI" i="0">
+                          <a:latin typeface="Cambria Math" panose="02040503050406030204" pitchFamily="18" charset="0"/>
+                        </a:rPr>
+                        <m:t>=</m:t>
+                      </m:r>
+                      <m:f>
+                        <m:fPr>
+                          <m:ctrlPr>
+                            <a:rPr lang="fi-FI" i="1">
+                              <a:latin typeface="Cambria Math" panose="02040503050406030204" pitchFamily="18" charset="0"/>
+                            </a:rPr>
+                          </m:ctrlPr>
+                        </m:fPr>
+                        <m:num>
+                          <m:r>
+                            <a:rPr lang="fi-FI" i="0">
+                              <a:latin typeface="Cambria Math" panose="02040503050406030204" pitchFamily="18" charset="0"/>
+                            </a:rPr>
+                            <m:t>1</m:t>
+                          </m:r>
+                        </m:num>
+                        <m:den>
+                          <m:r>
+                            <a:rPr lang="fi-FI" i="0">
+                              <a:latin typeface="Cambria Math" panose="02040503050406030204" pitchFamily="18" charset="0"/>
+                            </a:rPr>
+                            <m:t>2</m:t>
+                          </m:r>
+                          <m:r>
+                            <a:rPr lang="fi-FI" i="1">
+                              <a:latin typeface="Cambria Math" panose="02040503050406030204" pitchFamily="18" charset="0"/>
+                            </a:rPr>
+                            <m:t>𝑚</m:t>
+                          </m:r>
+                        </m:den>
+                      </m:f>
+                      <m:nary>
+                        <m:naryPr>
+                          <m:chr m:val="∑"/>
+                          <m:limLoc m:val="subSup"/>
+                          <m:grow m:val="on"/>
+                          <m:ctrlPr>
+                            <a:rPr lang="fi-FI" i="1">
+                              <a:latin typeface="Cambria Math" panose="02040503050406030204" pitchFamily="18" charset="0"/>
+                            </a:rPr>
+                          </m:ctrlPr>
+                        </m:naryPr>
+                        <m:sub>
+                          <m:r>
+                            <a:rPr lang="fi-FI" i="1">
+                              <a:latin typeface="Cambria Math" panose="02040503050406030204" pitchFamily="18" charset="0"/>
+                            </a:rPr>
+                            <m:t>𝑖</m:t>
+                          </m:r>
+                          <m:r>
+                            <a:rPr lang="fi-FI" i="0">
+                              <a:latin typeface="Cambria Math" panose="02040503050406030204" pitchFamily="18" charset="0"/>
+                            </a:rPr>
+                            <m:t>=1</m:t>
+                          </m:r>
+                        </m:sub>
+                        <m:sup>
+                          <m:r>
+                            <a:rPr lang="fi-FI" i="1">
+                              <a:latin typeface="Cambria Math" panose="02040503050406030204" pitchFamily="18" charset="0"/>
+                            </a:rPr>
+                            <m:t>𝑚</m:t>
+                          </m:r>
+                        </m:sup>
+                        <m:e>
+                          <m:sSup>
+                            <m:sSupPr>
+                              <m:ctrlPr>
+                                <a:rPr lang="fi-FI" i="1">
+                                  <a:latin typeface="Cambria Math" panose="02040503050406030204" pitchFamily="18" charset="0"/>
+                                </a:rPr>
+                              </m:ctrlPr>
+                            </m:sSupPr>
+                            <m:e>
+                              <m:d>
+                                <m:dPr>
+                                  <m:ctrlPr>
+                                    <a:rPr lang="fi-FI" i="1">
+                                      <a:latin typeface="Cambria Math" panose="02040503050406030204" pitchFamily="18" charset="0"/>
+                                    </a:rPr>
+                                  </m:ctrlPr>
+                                </m:dPr>
+                                <m:e>
+                                  <m:sSub>
+                                    <m:sSubPr>
+                                      <m:ctrlPr>
+                                        <a:rPr lang="fi-FI" i="1">
+                                          <a:latin typeface="Cambria Math" panose="02040503050406030204" pitchFamily="18" charset="0"/>
+                                        </a:rPr>
+                                      </m:ctrlPr>
+                                    </m:sSubPr>
+                                    <m:e>
+                                      <m:r>
+                                        <m:rPr>
+                                          <m:sty m:val="p"/>
+                                        </m:rPr>
+                                        <a:rPr lang="fi-FI">
+                                          <a:latin typeface="Cambria Math" panose="02040503050406030204" pitchFamily="18" charset="0"/>
+                                        </a:rPr>
+                                        <m:t>θ</m:t>
+                                      </m:r>
+                                    </m:e>
+                                    <m:sub>
+                                      <m:r>
+                                        <a:rPr lang="fi-FI">
+                                          <a:latin typeface="Cambria Math" panose="02040503050406030204" pitchFamily="18" charset="0"/>
+                                        </a:rPr>
+                                        <m:t>1</m:t>
+                                      </m:r>
+                                    </m:sub>
+                                  </m:sSub>
+                                  <m:sSup>
+                                    <m:sSupPr>
+                                      <m:ctrlPr>
+                                        <a:rPr lang="fi-FI" i="1" smtClean="0">
+                                          <a:latin typeface="Cambria Math" panose="02040503050406030204" pitchFamily="18" charset="0"/>
+                                        </a:rPr>
+                                      </m:ctrlPr>
+                                    </m:sSupPr>
+                                    <m:e>
+                                      <m:r>
+                                        <a:rPr lang="fi-FI" b="0" i="1" smtClean="0">
+                                          <a:latin typeface="Cambria Math" panose="02040503050406030204" pitchFamily="18" charset="0"/>
+                                        </a:rPr>
+                                        <m:t>𝑥</m:t>
+                                      </m:r>
+                                    </m:e>
+                                    <m:sup>
+                                      <m:r>
+                                        <a:rPr lang="fi-FI" b="0" i="1" smtClean="0">
+                                          <a:latin typeface="Cambria Math" panose="02040503050406030204" pitchFamily="18" charset="0"/>
+                                        </a:rPr>
+                                        <m:t>(</m:t>
+                                      </m:r>
+                                      <m:r>
+                                        <a:rPr lang="fi-FI" b="0" i="1" smtClean="0">
+                                          <a:latin typeface="Cambria Math" panose="02040503050406030204" pitchFamily="18" charset="0"/>
+                                        </a:rPr>
+                                        <m:t>𝑖</m:t>
+                                      </m:r>
+                                      <m:r>
+                                        <a:rPr lang="fi-FI" b="0" i="1" smtClean="0">
+                                          <a:latin typeface="Cambria Math" panose="02040503050406030204" pitchFamily="18" charset="0"/>
+                                        </a:rPr>
+                                        <m:t>)</m:t>
+                                      </m:r>
+                                    </m:sup>
+                                  </m:sSup>
+                                  <m:r>
+                                    <a:rPr lang="fi-FI" b="0" i="1" smtClean="0">
+                                      <a:latin typeface="Cambria Math" panose="02040503050406030204" pitchFamily="18" charset="0"/>
+                                    </a:rPr>
+                                    <m:t>−</m:t>
+                                  </m:r>
+                                  <m:sSup>
+                                    <m:sSupPr>
+                                      <m:ctrlPr>
+                                        <a:rPr lang="fi-FI" b="0" i="1" smtClean="0">
+                                          <a:latin typeface="Cambria Math" panose="02040503050406030204" pitchFamily="18" charset="0"/>
+                                        </a:rPr>
+                                      </m:ctrlPr>
+                                    </m:sSupPr>
+                                    <m:e>
+                                      <m:r>
+                                        <a:rPr lang="fi-FI" b="0" i="1" smtClean="0">
+                                          <a:latin typeface="Cambria Math" panose="02040503050406030204" pitchFamily="18" charset="0"/>
+                                        </a:rPr>
+                                        <m:t>𝑦</m:t>
+                                      </m:r>
+                                    </m:e>
+                                    <m:sup>
+                                      <m:r>
+                                        <a:rPr lang="fi-FI" b="0" i="1" smtClean="0">
+                                          <a:latin typeface="Cambria Math" panose="02040503050406030204" pitchFamily="18" charset="0"/>
+                                        </a:rPr>
+                                        <m:t>(</m:t>
+                                      </m:r>
+                                      <m:r>
+                                        <a:rPr lang="fi-FI" b="0" i="1" smtClean="0">
+                                          <a:latin typeface="Cambria Math" panose="02040503050406030204" pitchFamily="18" charset="0"/>
+                                        </a:rPr>
+                                        <m:t>𝑖</m:t>
+                                      </m:r>
+                                      <m:r>
+                                        <a:rPr lang="fi-FI" b="0" i="1" smtClean="0">
+                                          <a:latin typeface="Cambria Math" panose="02040503050406030204" pitchFamily="18" charset="0"/>
+                                        </a:rPr>
+                                        <m:t>)</m:t>
+                                      </m:r>
+                                    </m:sup>
+                                  </m:sSup>
+                                </m:e>
+                              </m:d>
+                            </m:e>
+                            <m:sup>
+                              <m:r>
+                                <a:rPr lang="fi-FI" i="0">
+                                  <a:latin typeface="Cambria Math" panose="02040503050406030204" pitchFamily="18" charset="0"/>
+                                </a:rPr>
+                                <m:t>2</m:t>
+                              </m:r>
+                            </m:sup>
+                          </m:sSup>
+                        </m:e>
+                      </m:nary>
+                      <m:r>
+                        <a:rPr lang="fi-FI" b="0" i="1" smtClean="0">
+                          <a:latin typeface="Cambria Math" panose="02040503050406030204" pitchFamily="18" charset="0"/>
+                        </a:rPr>
+                        <m:t>= </m:t>
+                      </m:r>
+                      <m:f>
+                        <m:fPr>
+                          <m:ctrlPr>
+                            <a:rPr lang="fi-FI" i="1">
+                              <a:latin typeface="Cambria Math" panose="02040503050406030204" pitchFamily="18" charset="0"/>
+                            </a:rPr>
+                          </m:ctrlPr>
+                        </m:fPr>
+                        <m:num>
+                          <m:r>
+                            <a:rPr lang="fi-FI">
+                              <a:latin typeface="Cambria Math" panose="02040503050406030204" pitchFamily="18" charset="0"/>
+                            </a:rPr>
+                            <m:t>1</m:t>
+                          </m:r>
+                        </m:num>
+                        <m:den>
+                          <m:r>
+                            <a:rPr lang="fi-FI">
+                              <a:latin typeface="Cambria Math" panose="02040503050406030204" pitchFamily="18" charset="0"/>
+                            </a:rPr>
+                            <m:t>2</m:t>
+                          </m:r>
+                          <m:r>
+                            <a:rPr lang="fi-FI" i="1">
+                              <a:latin typeface="Cambria Math" panose="02040503050406030204" pitchFamily="18" charset="0"/>
+                            </a:rPr>
+                            <m:t>𝑚</m:t>
+                          </m:r>
+                        </m:den>
+                      </m:f>
+                      <m:d>
+                        <m:dPr>
+                          <m:ctrlPr>
+                            <a:rPr lang="fi-FI" b="0" i="1" smtClean="0">
+                              <a:latin typeface="Cambria Math" panose="02040503050406030204" pitchFamily="18" charset="0"/>
+                            </a:rPr>
+                          </m:ctrlPr>
+                        </m:dPr>
+                        <m:e>
+                          <m:sSup>
+                            <m:sSupPr>
+                              <m:ctrlPr>
+                                <a:rPr lang="fi-FI" b="0" i="1" smtClean="0">
+                                  <a:latin typeface="Cambria Math" panose="02040503050406030204" pitchFamily="18" charset="0"/>
+                                </a:rPr>
+                              </m:ctrlPr>
+                            </m:sSupPr>
+                            <m:e>
+                              <m:r>
+                                <a:rPr lang="fi-FI" b="0" i="1" smtClean="0">
+                                  <a:latin typeface="Cambria Math" panose="02040503050406030204" pitchFamily="18" charset="0"/>
+                                </a:rPr>
+                                <m:t>0</m:t>
+                              </m:r>
+                            </m:e>
+                            <m:sup>
+                              <m:r>
+                                <a:rPr lang="fi-FI" b="0" i="1" smtClean="0">
+                                  <a:latin typeface="Cambria Math" panose="02040503050406030204" pitchFamily="18" charset="0"/>
+                                </a:rPr>
+                                <m:t>2</m:t>
+                              </m:r>
+                            </m:sup>
+                          </m:sSup>
+                          <m:r>
+                            <a:rPr lang="fi-FI" b="0" i="1" smtClean="0">
+                              <a:latin typeface="Cambria Math" panose="02040503050406030204" pitchFamily="18" charset="0"/>
+                            </a:rPr>
+                            <m:t>+</m:t>
+                          </m:r>
+                          <m:sSup>
+                            <m:sSupPr>
+                              <m:ctrlPr>
+                                <a:rPr lang="fi-FI" i="1">
+                                  <a:latin typeface="Cambria Math" panose="02040503050406030204" pitchFamily="18" charset="0"/>
+                                </a:rPr>
+                              </m:ctrlPr>
+                            </m:sSupPr>
+                            <m:e>
+                              <m:r>
+                                <a:rPr lang="fi-FI" i="1">
+                                  <a:latin typeface="Cambria Math" panose="02040503050406030204" pitchFamily="18" charset="0"/>
+                                </a:rPr>
+                                <m:t>0</m:t>
+                              </m:r>
+                            </m:e>
+                            <m:sup>
+                              <m:r>
+                                <a:rPr lang="fi-FI" i="1">
+                                  <a:latin typeface="Cambria Math" panose="02040503050406030204" pitchFamily="18" charset="0"/>
+                                </a:rPr>
+                                <m:t>2</m:t>
+                              </m:r>
+                            </m:sup>
+                          </m:sSup>
+                          <m:r>
+                            <a:rPr lang="fi-FI" b="0" i="1" smtClean="0">
+                              <a:latin typeface="Cambria Math" panose="02040503050406030204" pitchFamily="18" charset="0"/>
+                            </a:rPr>
+                            <m:t>+</m:t>
+                          </m:r>
+                          <m:sSup>
+                            <m:sSupPr>
+                              <m:ctrlPr>
+                                <a:rPr lang="fi-FI" i="1">
+                                  <a:latin typeface="Cambria Math" panose="02040503050406030204" pitchFamily="18" charset="0"/>
+                                </a:rPr>
+                              </m:ctrlPr>
+                            </m:sSupPr>
+                            <m:e>
+                              <m:r>
+                                <a:rPr lang="fi-FI" i="1">
+                                  <a:latin typeface="Cambria Math" panose="02040503050406030204" pitchFamily="18" charset="0"/>
+                                </a:rPr>
+                                <m:t>0</m:t>
+                              </m:r>
+                            </m:e>
+                            <m:sup>
+                              <m:r>
+                                <a:rPr lang="fi-FI" i="1">
+                                  <a:latin typeface="Cambria Math" panose="02040503050406030204" pitchFamily="18" charset="0"/>
+                                </a:rPr>
+                                <m:t>2</m:t>
+                              </m:r>
+                            </m:sup>
+                          </m:sSup>
+                        </m:e>
+                      </m:d>
+                      <m:r>
+                        <a:rPr lang="fi-FI" b="0" i="1" smtClean="0">
+                          <a:latin typeface="Cambria Math" panose="02040503050406030204" pitchFamily="18" charset="0"/>
+                        </a:rPr>
+                        <m:t>=0</m:t>
+                      </m:r>
+                    </m:oMath>
+                  </m:oMathPara>
+                </a14:m>
+                <a:endParaRPr lang="fi-FI" dirty="0"/>
+              </a:p>
+            </p:txBody>
+          </p:sp>
+        </mc:Choice>
+        <mc:Fallback>
+          <p:sp>
+            <p:nvSpPr>
+              <p:cNvPr id="6" name="Rectangle 5">
+                <a:extLst>
+                  <a:ext uri="{FF2B5EF4-FFF2-40B4-BE49-F238E27FC236}">
+                    <a16:creationId xmlns:a16="http://schemas.microsoft.com/office/drawing/2014/main" id="{DFBE6D0F-782D-D342-8DEA-DFFB800C88D6}"/>
+                  </a:ext>
+                </a:extLst>
+              </p:cNvPr>
+              <p:cNvSpPr>
+                <a:spLocks noRot="1" noChangeAspect="1" noMove="1" noResize="1" noEditPoints="1" noAdjustHandles="1" noChangeArrowheads="1" noChangeShapeType="1" noTextEdit="1"/>
+              </p:cNvSpPr>
+              <p:nvPr/>
+            </p:nvSpPr>
+            <p:spPr>
+              <a:xfrm>
+                <a:off x="983073" y="3423769"/>
+                <a:ext cx="6182783" cy="648639"/>
+              </a:xfrm>
+              <a:prstGeom prst="rect">
+                <a:avLst/>
+              </a:prstGeom>
+              <a:blipFill>
+                <a:blip r:embed="rId4"/>
+                <a:stretch>
+                  <a:fillRect t="-146154" b="-213462"/>
                 </a:stretch>
               </a:blipFill>
             </p:spPr>
@@ -4385,6 +5429,820 @@
     <p:extLst>
       <p:ext uri="{BB962C8B-B14F-4D97-AF65-F5344CB8AC3E}">
         <p14:creationId xmlns:p14="http://schemas.microsoft.com/office/powerpoint/2010/main" val="1113431946"/>
+      </p:ext>
+    </p:extLst>
+  </p:cSld>
+  <p:clrMapOvr>
+    <a:masterClrMapping/>
+  </p:clrMapOvr>
+</p:sld>
+</file>
+
+<file path=ppt/slides/slide3.xml><?xml version="1.0" encoding="utf-8"?>
+<p:sld xmlns:a="http://schemas.openxmlformats.org/drawingml/2006/main" xmlns:r="http://schemas.openxmlformats.org/officeDocument/2006/relationships" xmlns:p="http://schemas.openxmlformats.org/presentationml/2006/main">
+  <p:cSld>
+    <p:spTree>
+      <p:nvGrpSpPr>
+        <p:cNvPr id="1" name=""/>
+        <p:cNvGrpSpPr/>
+        <p:nvPr/>
+      </p:nvGrpSpPr>
+      <p:grpSpPr>
+        <a:xfrm>
+          <a:off x="0" y="0"/>
+          <a:ext cx="0" cy="0"/>
+          <a:chOff x="0" y="0"/>
+          <a:chExt cx="0" cy="0"/>
+        </a:xfrm>
+      </p:grpSpPr>
+      <p:pic>
+        <p:nvPicPr>
+          <p:cNvPr id="2" name="Picture 1">
+            <a:extLst>
+              <a:ext uri="{FF2B5EF4-FFF2-40B4-BE49-F238E27FC236}">
+                <a16:creationId xmlns:a16="http://schemas.microsoft.com/office/drawing/2014/main" id="{01911BF3-017B-D844-8561-C51BFFC3A4B2}"/>
+              </a:ext>
+            </a:extLst>
+          </p:cNvPr>
+          <p:cNvPicPr>
+            <a:picLocks noChangeAspect="1"/>
+          </p:cNvPicPr>
+          <p:nvPr/>
+        </p:nvPicPr>
+        <p:blipFill>
+          <a:blip r:embed="rId2"/>
+          <a:stretch>
+            <a:fillRect/>
+          </a:stretch>
+        </p:blipFill>
+        <p:spPr>
+          <a:xfrm>
+            <a:off x="2548890" y="1087219"/>
+            <a:ext cx="7615686" cy="5027831"/>
+          </a:xfrm>
+          <a:prstGeom prst="rect">
+            <a:avLst/>
+          </a:prstGeom>
+        </p:spPr>
+      </p:pic>
+      <p:cxnSp>
+        <p:nvCxnSpPr>
+          <p:cNvPr id="5" name="Straight Arrow Connector 4">
+            <a:extLst>
+              <a:ext uri="{FF2B5EF4-FFF2-40B4-BE49-F238E27FC236}">
+                <a16:creationId xmlns:a16="http://schemas.microsoft.com/office/drawing/2014/main" id="{43DFA104-2FEE-7742-ADAA-96B0D6930B87}"/>
+              </a:ext>
+            </a:extLst>
+          </p:cNvPr>
+          <p:cNvCxnSpPr>
+            <a:cxnSpLocks/>
+          </p:cNvCxnSpPr>
+          <p:nvPr/>
+        </p:nvCxnSpPr>
+        <p:spPr>
+          <a:xfrm flipH="1" flipV="1">
+            <a:off x="3814763" y="1943100"/>
+            <a:ext cx="612593" cy="1151612"/>
+          </a:xfrm>
+          <a:prstGeom prst="straightConnector1">
+            <a:avLst/>
+          </a:prstGeom>
+          <a:ln w="38100">
+            <a:solidFill>
+              <a:schemeClr val="accent1"/>
+            </a:solidFill>
+            <a:tailEnd type="triangle"/>
+          </a:ln>
+        </p:spPr>
+        <p:style>
+          <a:lnRef idx="1">
+            <a:schemeClr val="accent1"/>
+          </a:lnRef>
+          <a:fillRef idx="0">
+            <a:schemeClr val="accent1"/>
+          </a:fillRef>
+          <a:effectRef idx="0">
+            <a:schemeClr val="accent1"/>
+          </a:effectRef>
+          <a:fontRef idx="minor">
+            <a:schemeClr val="tx1"/>
+          </a:fontRef>
+        </p:style>
+      </p:cxnSp>
+      <p:cxnSp>
+        <p:nvCxnSpPr>
+          <p:cNvPr id="9" name="Straight Arrow Connector 8">
+            <a:extLst>
+              <a:ext uri="{FF2B5EF4-FFF2-40B4-BE49-F238E27FC236}">
+                <a16:creationId xmlns:a16="http://schemas.microsoft.com/office/drawing/2014/main" id="{8074EAE9-8F87-444F-88C3-231BF6CC5E3F}"/>
+              </a:ext>
+            </a:extLst>
+          </p:cNvPr>
+          <p:cNvCxnSpPr>
+            <a:cxnSpLocks/>
+          </p:cNvCxnSpPr>
+          <p:nvPr/>
+        </p:nvCxnSpPr>
+        <p:spPr>
+          <a:xfrm>
+            <a:off x="4427356" y="3094712"/>
+            <a:ext cx="635181" cy="1148903"/>
+          </a:xfrm>
+          <a:prstGeom prst="straightConnector1">
+            <a:avLst/>
+          </a:prstGeom>
+          <a:ln w="38100">
+            <a:solidFill>
+              <a:srgbClr val="FF0000"/>
+            </a:solidFill>
+            <a:tailEnd type="triangle"/>
+          </a:ln>
+        </p:spPr>
+        <p:style>
+          <a:lnRef idx="1">
+            <a:schemeClr val="accent1"/>
+          </a:lnRef>
+          <a:fillRef idx="0">
+            <a:schemeClr val="accent1"/>
+          </a:fillRef>
+          <a:effectRef idx="0">
+            <a:schemeClr val="accent1"/>
+          </a:effectRef>
+          <a:fontRef idx="minor">
+            <a:schemeClr val="tx1"/>
+          </a:fontRef>
+        </p:style>
+      </p:cxnSp>
+      <p:sp>
+        <p:nvSpPr>
+          <p:cNvPr id="3" name="Oval 2">
+            <a:extLst>
+              <a:ext uri="{FF2B5EF4-FFF2-40B4-BE49-F238E27FC236}">
+                <a16:creationId xmlns:a16="http://schemas.microsoft.com/office/drawing/2014/main" id="{3FB72E08-ADD6-A749-B11E-61DD04F8102A}"/>
+              </a:ext>
+            </a:extLst>
+          </p:cNvPr>
+          <p:cNvSpPr/>
+          <p:nvPr/>
+        </p:nvSpPr>
+        <p:spPr>
+          <a:xfrm>
+            <a:off x="4363403" y="3014663"/>
+            <a:ext cx="144000" cy="144000"/>
+          </a:xfrm>
+          <a:prstGeom prst="ellipse">
+            <a:avLst/>
+          </a:prstGeom>
+        </p:spPr>
+        <p:style>
+          <a:lnRef idx="2">
+            <a:schemeClr val="accent1">
+              <a:shade val="50000"/>
+            </a:schemeClr>
+          </a:lnRef>
+          <a:fillRef idx="1">
+            <a:schemeClr val="accent1"/>
+          </a:fillRef>
+          <a:effectRef idx="0">
+            <a:schemeClr val="accent1"/>
+          </a:effectRef>
+          <a:fontRef idx="minor">
+            <a:schemeClr val="lt1"/>
+          </a:fontRef>
+        </p:style>
+        <p:txBody>
+          <a:bodyPr rtlCol="0" anchor="ctr"/>
+          <a:lstStyle/>
+          <a:p>
+            <a:pPr algn="ctr"/>
+            <a:endParaRPr lang="fi-FI"/>
+          </a:p>
+        </p:txBody>
+      </p:sp>
+      <p:sp>
+        <p:nvSpPr>
+          <p:cNvPr id="13" name="Oval 12">
+            <a:extLst>
+              <a:ext uri="{FF2B5EF4-FFF2-40B4-BE49-F238E27FC236}">
+                <a16:creationId xmlns:a16="http://schemas.microsoft.com/office/drawing/2014/main" id="{C7284F2C-58B4-1241-9B13-F34A3A2B2353}"/>
+              </a:ext>
+            </a:extLst>
+          </p:cNvPr>
+          <p:cNvSpPr/>
+          <p:nvPr/>
+        </p:nvSpPr>
+        <p:spPr>
+          <a:xfrm>
+            <a:off x="5062537" y="4099615"/>
+            <a:ext cx="144000" cy="144000"/>
+          </a:xfrm>
+          <a:prstGeom prst="ellipse">
+            <a:avLst/>
+          </a:prstGeom>
+        </p:spPr>
+        <p:style>
+          <a:lnRef idx="2">
+            <a:schemeClr val="accent1">
+              <a:shade val="50000"/>
+            </a:schemeClr>
+          </a:lnRef>
+          <a:fillRef idx="1">
+            <a:schemeClr val="accent1"/>
+          </a:fillRef>
+          <a:effectRef idx="0">
+            <a:schemeClr val="accent1"/>
+          </a:effectRef>
+          <a:fontRef idx="minor">
+            <a:schemeClr val="lt1"/>
+          </a:fontRef>
+        </p:style>
+        <p:txBody>
+          <a:bodyPr rtlCol="0" anchor="ctr"/>
+          <a:lstStyle/>
+          <a:p>
+            <a:pPr algn="ctr"/>
+            <a:endParaRPr lang="fi-FI"/>
+          </a:p>
+        </p:txBody>
+      </p:sp>
+      <p:cxnSp>
+        <p:nvCxnSpPr>
+          <p:cNvPr id="14" name="Straight Arrow Connector 13">
+            <a:extLst>
+              <a:ext uri="{FF2B5EF4-FFF2-40B4-BE49-F238E27FC236}">
+                <a16:creationId xmlns:a16="http://schemas.microsoft.com/office/drawing/2014/main" id="{68CA6836-EE4D-3741-8E87-DDA11B6A5E56}"/>
+              </a:ext>
+            </a:extLst>
+          </p:cNvPr>
+          <p:cNvCxnSpPr>
+            <a:cxnSpLocks/>
+          </p:cNvCxnSpPr>
+          <p:nvPr/>
+        </p:nvCxnSpPr>
+        <p:spPr>
+          <a:xfrm flipH="1" flipV="1">
+            <a:off x="4398627" y="3158663"/>
+            <a:ext cx="770201" cy="1079612"/>
+          </a:xfrm>
+          <a:prstGeom prst="straightConnector1">
+            <a:avLst/>
+          </a:prstGeom>
+          <a:ln w="38100">
+            <a:solidFill>
+              <a:schemeClr val="accent1"/>
+            </a:solidFill>
+            <a:tailEnd type="triangle"/>
+          </a:ln>
+        </p:spPr>
+        <p:style>
+          <a:lnRef idx="1">
+            <a:schemeClr val="accent1"/>
+          </a:lnRef>
+          <a:fillRef idx="0">
+            <a:schemeClr val="accent1"/>
+          </a:fillRef>
+          <a:effectRef idx="0">
+            <a:schemeClr val="accent1"/>
+          </a:effectRef>
+          <a:fontRef idx="minor">
+            <a:schemeClr val="tx1"/>
+          </a:fontRef>
+        </p:style>
+      </p:cxnSp>
+      <p:cxnSp>
+        <p:nvCxnSpPr>
+          <p:cNvPr id="16" name="Straight Arrow Connector 15">
+            <a:extLst>
+              <a:ext uri="{FF2B5EF4-FFF2-40B4-BE49-F238E27FC236}">
+                <a16:creationId xmlns:a16="http://schemas.microsoft.com/office/drawing/2014/main" id="{F3A2AEAE-CF73-B64D-ABDE-9D4A23440338}"/>
+              </a:ext>
+            </a:extLst>
+          </p:cNvPr>
+          <p:cNvCxnSpPr>
+            <a:cxnSpLocks/>
+          </p:cNvCxnSpPr>
+          <p:nvPr/>
+        </p:nvCxnSpPr>
+        <p:spPr>
+          <a:xfrm>
+            <a:off x="5091266" y="4099615"/>
+            <a:ext cx="750452" cy="1029598"/>
+          </a:xfrm>
+          <a:prstGeom prst="straightConnector1">
+            <a:avLst/>
+          </a:prstGeom>
+          <a:ln w="38100">
+            <a:solidFill>
+              <a:srgbClr val="FF0000"/>
+            </a:solidFill>
+            <a:tailEnd type="triangle"/>
+          </a:ln>
+        </p:spPr>
+        <p:style>
+          <a:lnRef idx="1">
+            <a:schemeClr val="accent1"/>
+          </a:lnRef>
+          <a:fillRef idx="0">
+            <a:schemeClr val="accent1"/>
+          </a:fillRef>
+          <a:effectRef idx="0">
+            <a:schemeClr val="accent1"/>
+          </a:effectRef>
+          <a:fontRef idx="minor">
+            <a:schemeClr val="tx1"/>
+          </a:fontRef>
+        </p:style>
+      </p:cxnSp>
+      <p:cxnSp>
+        <p:nvCxnSpPr>
+          <p:cNvPr id="21" name="Straight Arrow Connector 20">
+            <a:extLst>
+              <a:ext uri="{FF2B5EF4-FFF2-40B4-BE49-F238E27FC236}">
+                <a16:creationId xmlns:a16="http://schemas.microsoft.com/office/drawing/2014/main" id="{9327ED50-1DDE-C74F-AF02-DD8872FD6DE7}"/>
+              </a:ext>
+            </a:extLst>
+          </p:cNvPr>
+          <p:cNvCxnSpPr>
+            <a:cxnSpLocks/>
+          </p:cNvCxnSpPr>
+          <p:nvPr/>
+        </p:nvCxnSpPr>
+        <p:spPr>
+          <a:xfrm flipH="1" flipV="1">
+            <a:off x="5062537" y="4238275"/>
+            <a:ext cx="865877" cy="694982"/>
+          </a:xfrm>
+          <a:prstGeom prst="straightConnector1">
+            <a:avLst/>
+          </a:prstGeom>
+          <a:ln w="38100">
+            <a:solidFill>
+              <a:schemeClr val="accent1"/>
+            </a:solidFill>
+            <a:tailEnd type="triangle"/>
+          </a:ln>
+        </p:spPr>
+        <p:style>
+          <a:lnRef idx="1">
+            <a:schemeClr val="accent1"/>
+          </a:lnRef>
+          <a:fillRef idx="0">
+            <a:schemeClr val="accent1"/>
+          </a:fillRef>
+          <a:effectRef idx="0">
+            <a:schemeClr val="accent1"/>
+          </a:effectRef>
+          <a:fontRef idx="minor">
+            <a:schemeClr val="tx1"/>
+          </a:fontRef>
+        </p:style>
+      </p:cxnSp>
+      <p:cxnSp>
+        <p:nvCxnSpPr>
+          <p:cNvPr id="23" name="Straight Arrow Connector 22">
+            <a:extLst>
+              <a:ext uri="{FF2B5EF4-FFF2-40B4-BE49-F238E27FC236}">
+                <a16:creationId xmlns:a16="http://schemas.microsoft.com/office/drawing/2014/main" id="{6BE58E7E-EAF0-C64F-B8F0-CB88FD242753}"/>
+              </a:ext>
+            </a:extLst>
+          </p:cNvPr>
+          <p:cNvCxnSpPr>
+            <a:cxnSpLocks/>
+          </p:cNvCxnSpPr>
+          <p:nvPr/>
+        </p:nvCxnSpPr>
+        <p:spPr>
+          <a:xfrm>
+            <a:off x="5882711" y="4896413"/>
+            <a:ext cx="1061014" cy="622982"/>
+          </a:xfrm>
+          <a:prstGeom prst="straightConnector1">
+            <a:avLst/>
+          </a:prstGeom>
+          <a:ln w="38100">
+            <a:solidFill>
+              <a:srgbClr val="FF0000"/>
+            </a:solidFill>
+            <a:tailEnd type="triangle"/>
+          </a:ln>
+        </p:spPr>
+        <p:style>
+          <a:lnRef idx="1">
+            <a:schemeClr val="accent1"/>
+          </a:lnRef>
+          <a:fillRef idx="0">
+            <a:schemeClr val="accent1"/>
+          </a:fillRef>
+          <a:effectRef idx="0">
+            <a:schemeClr val="accent1"/>
+          </a:effectRef>
+          <a:fontRef idx="minor">
+            <a:schemeClr val="tx1"/>
+          </a:fontRef>
+        </p:style>
+      </p:cxnSp>
+      <p:sp>
+        <p:nvSpPr>
+          <p:cNvPr id="20" name="Oval 19">
+            <a:extLst>
+              <a:ext uri="{FF2B5EF4-FFF2-40B4-BE49-F238E27FC236}">
+                <a16:creationId xmlns:a16="http://schemas.microsoft.com/office/drawing/2014/main" id="{165B1A5B-8E32-BC44-872A-477F9029D3DD}"/>
+              </a:ext>
+            </a:extLst>
+          </p:cNvPr>
+          <p:cNvSpPr/>
+          <p:nvPr/>
+        </p:nvSpPr>
+        <p:spPr>
+          <a:xfrm>
+            <a:off x="5841718" y="4824413"/>
+            <a:ext cx="144000" cy="144000"/>
+          </a:xfrm>
+          <a:prstGeom prst="ellipse">
+            <a:avLst/>
+          </a:prstGeom>
+        </p:spPr>
+        <p:style>
+          <a:lnRef idx="2">
+            <a:schemeClr val="accent1">
+              <a:shade val="50000"/>
+            </a:schemeClr>
+          </a:lnRef>
+          <a:fillRef idx="1">
+            <a:schemeClr val="accent1"/>
+          </a:fillRef>
+          <a:effectRef idx="0">
+            <a:schemeClr val="accent1"/>
+          </a:effectRef>
+          <a:fontRef idx="minor">
+            <a:schemeClr val="lt1"/>
+          </a:fontRef>
+        </p:style>
+        <p:txBody>
+          <a:bodyPr rtlCol="0" anchor="ctr"/>
+          <a:lstStyle/>
+          <a:p>
+            <a:pPr algn="ctr"/>
+            <a:endParaRPr lang="fi-FI"/>
+          </a:p>
+        </p:txBody>
+      </p:sp>
+      <p:cxnSp>
+        <p:nvCxnSpPr>
+          <p:cNvPr id="27" name="Straight Arrow Connector 26">
+            <a:extLst>
+              <a:ext uri="{FF2B5EF4-FFF2-40B4-BE49-F238E27FC236}">
+                <a16:creationId xmlns:a16="http://schemas.microsoft.com/office/drawing/2014/main" id="{09EB9BBC-6E14-9A43-A6E6-4BDA1877076E}"/>
+              </a:ext>
+            </a:extLst>
+          </p:cNvPr>
+          <p:cNvCxnSpPr>
+            <a:cxnSpLocks/>
+          </p:cNvCxnSpPr>
+          <p:nvPr/>
+        </p:nvCxnSpPr>
+        <p:spPr>
+          <a:xfrm flipV="1">
+            <a:off x="6943725" y="4925549"/>
+            <a:ext cx="736224" cy="239491"/>
+          </a:xfrm>
+          <a:prstGeom prst="straightConnector1">
+            <a:avLst/>
+          </a:prstGeom>
+          <a:ln w="38100">
+            <a:solidFill>
+              <a:schemeClr val="accent1"/>
+            </a:solidFill>
+            <a:tailEnd type="triangle"/>
+          </a:ln>
+        </p:spPr>
+        <p:style>
+          <a:lnRef idx="1">
+            <a:schemeClr val="accent1"/>
+          </a:lnRef>
+          <a:fillRef idx="0">
+            <a:schemeClr val="accent1"/>
+          </a:fillRef>
+          <a:effectRef idx="0">
+            <a:schemeClr val="accent1"/>
+          </a:effectRef>
+          <a:fontRef idx="minor">
+            <a:schemeClr val="tx1"/>
+          </a:fontRef>
+        </p:style>
+      </p:cxnSp>
+      <p:cxnSp>
+        <p:nvCxnSpPr>
+          <p:cNvPr id="30" name="Straight Arrow Connector 29">
+            <a:extLst>
+              <a:ext uri="{FF2B5EF4-FFF2-40B4-BE49-F238E27FC236}">
+                <a16:creationId xmlns:a16="http://schemas.microsoft.com/office/drawing/2014/main" id="{BAC72AAD-E496-C343-91B4-E35796D983AE}"/>
+              </a:ext>
+            </a:extLst>
+          </p:cNvPr>
+          <p:cNvCxnSpPr>
+            <a:cxnSpLocks/>
+          </p:cNvCxnSpPr>
+          <p:nvPr/>
+        </p:nvCxnSpPr>
+        <p:spPr>
+          <a:xfrm flipH="1">
+            <a:off x="6240838" y="5173886"/>
+            <a:ext cx="703116" cy="195233"/>
+          </a:xfrm>
+          <a:prstGeom prst="straightConnector1">
+            <a:avLst/>
+          </a:prstGeom>
+          <a:ln w="38100">
+            <a:solidFill>
+              <a:srgbClr val="FF0000"/>
+            </a:solidFill>
+            <a:tailEnd type="triangle"/>
+          </a:ln>
+        </p:spPr>
+        <p:style>
+          <a:lnRef idx="1">
+            <a:schemeClr val="accent1"/>
+          </a:lnRef>
+          <a:fillRef idx="0">
+            <a:schemeClr val="accent1"/>
+          </a:fillRef>
+          <a:effectRef idx="0">
+            <a:schemeClr val="accent1"/>
+          </a:effectRef>
+          <a:fontRef idx="minor">
+            <a:schemeClr val="tx1"/>
+          </a:fontRef>
+        </p:style>
+      </p:cxnSp>
+      <p:sp>
+        <p:nvSpPr>
+          <p:cNvPr id="26" name="Oval 25">
+            <a:extLst>
+              <a:ext uri="{FF2B5EF4-FFF2-40B4-BE49-F238E27FC236}">
+                <a16:creationId xmlns:a16="http://schemas.microsoft.com/office/drawing/2014/main" id="{94F1649F-BB38-6F42-A478-D3B4452291AF}"/>
+              </a:ext>
+            </a:extLst>
+          </p:cNvPr>
+          <p:cNvSpPr/>
+          <p:nvPr/>
+        </p:nvSpPr>
+        <p:spPr>
+          <a:xfrm>
+            <a:off x="6871725" y="5097804"/>
+            <a:ext cx="144000" cy="144000"/>
+          </a:xfrm>
+          <a:prstGeom prst="ellipse">
+            <a:avLst/>
+          </a:prstGeom>
+        </p:spPr>
+        <p:style>
+          <a:lnRef idx="2">
+            <a:schemeClr val="accent1">
+              <a:shade val="50000"/>
+            </a:schemeClr>
+          </a:lnRef>
+          <a:fillRef idx="1">
+            <a:schemeClr val="accent1"/>
+          </a:fillRef>
+          <a:effectRef idx="0">
+            <a:schemeClr val="accent1"/>
+          </a:effectRef>
+          <a:fontRef idx="minor">
+            <a:schemeClr val="lt1"/>
+          </a:fontRef>
+        </p:style>
+        <p:txBody>
+          <a:bodyPr rtlCol="0" anchor="ctr"/>
+          <a:lstStyle/>
+          <a:p>
+            <a:pPr algn="ctr"/>
+            <a:endParaRPr lang="fi-FI"/>
+          </a:p>
+        </p:txBody>
+      </p:sp>
+      <p:sp>
+        <p:nvSpPr>
+          <p:cNvPr id="33" name="TextBox 32">
+            <a:extLst>
+              <a:ext uri="{FF2B5EF4-FFF2-40B4-BE49-F238E27FC236}">
+                <a16:creationId xmlns:a16="http://schemas.microsoft.com/office/drawing/2014/main" id="{2661117B-3FCC-3748-A2E7-7447A29D92D1}"/>
+              </a:ext>
+            </a:extLst>
+          </p:cNvPr>
+          <p:cNvSpPr txBox="1"/>
+          <p:nvPr/>
+        </p:nvSpPr>
+        <p:spPr>
+          <a:xfrm>
+            <a:off x="4513004" y="2901997"/>
+            <a:ext cx="359394" cy="369332"/>
+          </a:xfrm>
+          <a:prstGeom prst="rect">
+            <a:avLst/>
+          </a:prstGeom>
+          <a:noFill/>
+        </p:spPr>
+        <p:txBody>
+          <a:bodyPr wrap="none" rtlCol="0">
+            <a:spAutoFit/>
+          </a:bodyPr>
+          <a:lstStyle/>
+          <a:p>
+            <a:r>
+              <a:rPr lang="fi-FI" dirty="0"/>
+              <a:t>1.</a:t>
+            </a:r>
+          </a:p>
+        </p:txBody>
+      </p:sp>
+      <p:sp>
+        <p:nvSpPr>
+          <p:cNvPr id="34" name="TextBox 33">
+            <a:extLst>
+              <a:ext uri="{FF2B5EF4-FFF2-40B4-BE49-F238E27FC236}">
+                <a16:creationId xmlns:a16="http://schemas.microsoft.com/office/drawing/2014/main" id="{D0A8B000-BA0F-2C49-AF25-7C7F79CA657E}"/>
+              </a:ext>
+            </a:extLst>
+          </p:cNvPr>
+          <p:cNvSpPr txBox="1"/>
+          <p:nvPr/>
+        </p:nvSpPr>
+        <p:spPr>
+          <a:xfrm>
+            <a:off x="5204052" y="3868943"/>
+            <a:ext cx="359394" cy="369332"/>
+          </a:xfrm>
+          <a:prstGeom prst="rect">
+            <a:avLst/>
+          </a:prstGeom>
+          <a:noFill/>
+        </p:spPr>
+        <p:txBody>
+          <a:bodyPr wrap="none" rtlCol="0">
+            <a:spAutoFit/>
+          </a:bodyPr>
+          <a:lstStyle/>
+          <a:p>
+            <a:r>
+              <a:rPr lang="fi-FI" dirty="0"/>
+              <a:t>2.</a:t>
+            </a:r>
+          </a:p>
+        </p:txBody>
+      </p:sp>
+      <p:sp>
+        <p:nvSpPr>
+          <p:cNvPr id="35" name="TextBox 34">
+            <a:extLst>
+              <a:ext uri="{FF2B5EF4-FFF2-40B4-BE49-F238E27FC236}">
+                <a16:creationId xmlns:a16="http://schemas.microsoft.com/office/drawing/2014/main" id="{6559869C-0E52-5A4D-AFA3-B5DB60821B85}"/>
+              </a:ext>
+            </a:extLst>
+          </p:cNvPr>
+          <p:cNvSpPr txBox="1"/>
+          <p:nvPr/>
+        </p:nvSpPr>
+        <p:spPr>
+          <a:xfrm>
+            <a:off x="5913718" y="4556217"/>
+            <a:ext cx="359394" cy="369332"/>
+          </a:xfrm>
+          <a:prstGeom prst="rect">
+            <a:avLst/>
+          </a:prstGeom>
+          <a:noFill/>
+        </p:spPr>
+        <p:txBody>
+          <a:bodyPr wrap="none" rtlCol="0">
+            <a:spAutoFit/>
+          </a:bodyPr>
+          <a:lstStyle/>
+          <a:p>
+            <a:r>
+              <a:rPr lang="fi-FI" dirty="0"/>
+              <a:t>3.</a:t>
+            </a:r>
+          </a:p>
+        </p:txBody>
+      </p:sp>
+      <p:sp>
+        <p:nvSpPr>
+          <p:cNvPr id="36" name="TextBox 35">
+            <a:extLst>
+              <a:ext uri="{FF2B5EF4-FFF2-40B4-BE49-F238E27FC236}">
+                <a16:creationId xmlns:a16="http://schemas.microsoft.com/office/drawing/2014/main" id="{278B723D-B245-A846-86E3-F634050DF42E}"/>
+              </a:ext>
+            </a:extLst>
+          </p:cNvPr>
+          <p:cNvSpPr txBox="1"/>
+          <p:nvPr/>
+        </p:nvSpPr>
+        <p:spPr>
+          <a:xfrm>
+            <a:off x="6795035" y="4740777"/>
+            <a:ext cx="359394" cy="369332"/>
+          </a:xfrm>
+          <a:prstGeom prst="rect">
+            <a:avLst/>
+          </a:prstGeom>
+          <a:noFill/>
+        </p:spPr>
+        <p:txBody>
+          <a:bodyPr wrap="square" rtlCol="0">
+            <a:spAutoFit/>
+          </a:bodyPr>
+          <a:lstStyle/>
+          <a:p>
+            <a:r>
+              <a:rPr lang="fi-FI" dirty="0"/>
+              <a:t>4.</a:t>
+            </a:r>
+          </a:p>
+        </p:txBody>
+      </p:sp>
+      <p:sp>
+        <p:nvSpPr>
+          <p:cNvPr id="37" name="TextBox 36">
+            <a:extLst>
+              <a:ext uri="{FF2B5EF4-FFF2-40B4-BE49-F238E27FC236}">
+                <a16:creationId xmlns:a16="http://schemas.microsoft.com/office/drawing/2014/main" id="{34BD3EB6-6A3F-5748-B4ED-AB8248488FDD}"/>
+              </a:ext>
+            </a:extLst>
+          </p:cNvPr>
+          <p:cNvSpPr txBox="1"/>
+          <p:nvPr/>
+        </p:nvSpPr>
+        <p:spPr>
+          <a:xfrm>
+            <a:off x="6470127" y="4783747"/>
+            <a:ext cx="364202" cy="369332"/>
+          </a:xfrm>
+          <a:prstGeom prst="rect">
+            <a:avLst/>
+          </a:prstGeom>
+          <a:noFill/>
+        </p:spPr>
+        <p:txBody>
+          <a:bodyPr wrap="none" rtlCol="0">
+            <a:spAutoFit/>
+          </a:bodyPr>
+          <a:lstStyle/>
+          <a:p>
+            <a:r>
+              <a:rPr lang="fi-FI" dirty="0"/>
+              <a:t>n.</a:t>
+            </a:r>
+          </a:p>
+        </p:txBody>
+      </p:sp>
+      <p:cxnSp>
+        <p:nvCxnSpPr>
+          <p:cNvPr id="39" name="Straight Arrow Connector 38">
+            <a:extLst>
+              <a:ext uri="{FF2B5EF4-FFF2-40B4-BE49-F238E27FC236}">
+                <a16:creationId xmlns:a16="http://schemas.microsoft.com/office/drawing/2014/main" id="{DA7B4EE2-BA78-A847-B977-BF86C0D9816C}"/>
+              </a:ext>
+            </a:extLst>
+          </p:cNvPr>
+          <p:cNvCxnSpPr/>
+          <p:nvPr/>
+        </p:nvCxnSpPr>
+        <p:spPr>
+          <a:xfrm>
+            <a:off x="5563446" y="5173886"/>
+            <a:ext cx="2296200" cy="0"/>
+          </a:xfrm>
+          <a:prstGeom prst="straightConnector1">
+            <a:avLst/>
+          </a:prstGeom>
+          <a:ln w="38100">
+            <a:solidFill>
+              <a:srgbClr val="92D050"/>
+            </a:solidFill>
+            <a:headEnd type="triangle"/>
+            <a:tailEnd type="triangle"/>
+          </a:ln>
+        </p:spPr>
+        <p:style>
+          <a:lnRef idx="1">
+            <a:schemeClr val="accent1"/>
+          </a:lnRef>
+          <a:fillRef idx="0">
+            <a:schemeClr val="accent1"/>
+          </a:fillRef>
+          <a:effectRef idx="0">
+            <a:schemeClr val="accent1"/>
+          </a:effectRef>
+          <a:fontRef idx="minor">
+            <a:schemeClr val="tx1"/>
+          </a:fontRef>
+        </p:style>
+      </p:cxnSp>
+    </p:spTree>
+    <p:extLst>
+      <p:ext uri="{BB962C8B-B14F-4D97-AF65-F5344CB8AC3E}">
+        <p14:creationId xmlns:p14="http://schemas.microsoft.com/office/powerpoint/2010/main" val="2885806288"/>
       </p:ext>
     </p:extLst>
   </p:cSld>

</xml_diff>

<commit_message>
Done with the simple training algorithm.
</commit_message>
<xml_diff>
--- a/PizzaML/Pictures.pptx
+++ b/PizzaML/Pictures.pptx
@@ -4949,7 +4949,7 @@
             </p:nvSpPr>
             <p:spPr>
               <a:xfrm>
-                <a:off x="983073" y="3423769"/>
+                <a:off x="3006179" y="2552231"/>
                 <a:ext cx="6182783" cy="648639"/>
               </a:xfrm>
               <a:prstGeom prst="rect">
@@ -5397,7 +5397,7 @@
             </p:nvSpPr>
             <p:spPr>
               <a:xfrm>
-                <a:off x="983073" y="3423769"/>
+                <a:off x="3006179" y="2552231"/>
                 <a:ext cx="6182783" cy="648639"/>
               </a:xfrm>
               <a:prstGeom prst="rect">
@@ -5406,7 +5406,518 @@
               <a:blipFill>
                 <a:blip r:embed="rId4"/>
                 <a:stretch>
-                  <a:fillRect t="-146154" b="-213462"/>
+                  <a:fillRect t="-144231" b="-213462"/>
+                </a:stretch>
+              </a:blipFill>
+            </p:spPr>
+            <p:txBody>
+              <a:bodyPr/>
+              <a:lstStyle/>
+              <a:p>
+                <a:r>
+                  <a:rPr lang="fi-FI">
+                    <a:noFill/>
+                  </a:rPr>
+                  <a:t> </a:t>
+                </a:r>
+              </a:p>
+            </p:txBody>
+          </p:sp>
+        </mc:Fallback>
+      </mc:AlternateContent>
+      <mc:AlternateContent xmlns:mc="http://schemas.openxmlformats.org/markup-compatibility/2006">
+        <mc:Choice xmlns:a14="http://schemas.microsoft.com/office/drawing/2010/main" Requires="a14">
+          <p:sp>
+            <p:nvSpPr>
+              <p:cNvPr id="7" name="Rectangle 6">
+                <a:extLst>
+                  <a:ext uri="{FF2B5EF4-FFF2-40B4-BE49-F238E27FC236}">
+                    <a16:creationId xmlns:a16="http://schemas.microsoft.com/office/drawing/2014/main" id="{37EBA3F8-7318-A145-A098-F5CF2148D748}"/>
+                  </a:ext>
+                </a:extLst>
+              </p:cNvPr>
+              <p:cNvSpPr/>
+              <p:nvPr/>
+            </p:nvSpPr>
+            <p:spPr>
+              <a:xfrm>
+                <a:off x="2035585" y="3690469"/>
+                <a:ext cx="8692829" cy="648639"/>
+              </a:xfrm>
+              <a:prstGeom prst="rect">
+                <a:avLst/>
+              </a:prstGeom>
+            </p:spPr>
+            <p:txBody>
+              <a:bodyPr wrap="none">
+                <a:spAutoFit/>
+              </a:bodyPr>
+              <a:lstStyle/>
+              <a:p>
+                <a:pPr/>
+                <a14:m>
+                  <m:oMathPara xmlns:m="http://schemas.openxmlformats.org/officeDocument/2006/math">
+                    <m:oMathParaPr>
+                      <m:jc m:val="centerGroup"/>
+                    </m:oMathParaPr>
+                    <m:oMath xmlns:m="http://schemas.openxmlformats.org/officeDocument/2006/math">
+                      <m:r>
+                        <a:rPr lang="fi-FI" i="1" smtClean="0">
+                          <a:latin typeface="Cambria Math" panose="02040503050406030204" pitchFamily="18" charset="0"/>
+                        </a:rPr>
+                        <m:t>𝐽</m:t>
+                      </m:r>
+                      <m:d>
+                        <m:dPr>
+                          <m:ctrlPr>
+                            <a:rPr lang="fi-FI" i="1">
+                              <a:latin typeface="Cambria Math" panose="02040503050406030204" pitchFamily="18" charset="0"/>
+                            </a:rPr>
+                          </m:ctrlPr>
+                        </m:dPr>
+                        <m:e>
+                          <m:sSub>
+                            <m:sSubPr>
+                              <m:ctrlPr>
+                                <a:rPr lang="fi-FI" i="1">
+                                  <a:latin typeface="Cambria Math" panose="02040503050406030204" pitchFamily="18" charset="0"/>
+                                </a:rPr>
+                              </m:ctrlPr>
+                            </m:sSubPr>
+                            <m:e>
+                              <m:r>
+                                <m:rPr>
+                                  <m:sty m:val="p"/>
+                                </m:rPr>
+                                <a:rPr lang="fi-FI" i="0">
+                                  <a:latin typeface="Cambria Math" panose="02040503050406030204" pitchFamily="18" charset="0"/>
+                                </a:rPr>
+                                <m:t>θ</m:t>
+                              </m:r>
+                            </m:e>
+                            <m:sub>
+                              <m:r>
+                                <a:rPr lang="fi-FI" b="0" i="0" smtClean="0">
+                                  <a:latin typeface="Cambria Math" panose="02040503050406030204" pitchFamily="18" charset="0"/>
+                                </a:rPr>
+                                <m:t>1</m:t>
+                              </m:r>
+                            </m:sub>
+                          </m:sSub>
+                          <m:r>
+                            <a:rPr lang="fi-FI" i="1" smtClean="0">
+                              <a:latin typeface="Cambria Math" panose="02040503050406030204" pitchFamily="18" charset="0"/>
+                            </a:rPr>
+                            <m:t> </m:t>
+                          </m:r>
+                        </m:e>
+                      </m:d>
+                      <m:r>
+                        <a:rPr lang="fi-FI" i="0">
+                          <a:latin typeface="Cambria Math" panose="02040503050406030204" pitchFamily="18" charset="0"/>
+                        </a:rPr>
+                        <m:t>=</m:t>
+                      </m:r>
+                      <m:f>
+                        <m:fPr>
+                          <m:ctrlPr>
+                            <a:rPr lang="fi-FI" i="1">
+                              <a:latin typeface="Cambria Math" panose="02040503050406030204" pitchFamily="18" charset="0"/>
+                            </a:rPr>
+                          </m:ctrlPr>
+                        </m:fPr>
+                        <m:num>
+                          <m:r>
+                            <a:rPr lang="fi-FI" i="0">
+                              <a:latin typeface="Cambria Math" panose="02040503050406030204" pitchFamily="18" charset="0"/>
+                            </a:rPr>
+                            <m:t>1</m:t>
+                          </m:r>
+                        </m:num>
+                        <m:den>
+                          <m:r>
+                            <a:rPr lang="fi-FI" i="0">
+                              <a:latin typeface="Cambria Math" panose="02040503050406030204" pitchFamily="18" charset="0"/>
+                            </a:rPr>
+                            <m:t>2</m:t>
+                          </m:r>
+                          <m:r>
+                            <a:rPr lang="fi-FI" i="1">
+                              <a:latin typeface="Cambria Math" panose="02040503050406030204" pitchFamily="18" charset="0"/>
+                            </a:rPr>
+                            <m:t>𝑚</m:t>
+                          </m:r>
+                        </m:den>
+                      </m:f>
+                      <m:nary>
+                        <m:naryPr>
+                          <m:chr m:val="∑"/>
+                          <m:limLoc m:val="subSup"/>
+                          <m:grow m:val="on"/>
+                          <m:ctrlPr>
+                            <a:rPr lang="fi-FI" i="1">
+                              <a:latin typeface="Cambria Math" panose="02040503050406030204" pitchFamily="18" charset="0"/>
+                            </a:rPr>
+                          </m:ctrlPr>
+                        </m:naryPr>
+                        <m:sub>
+                          <m:r>
+                            <a:rPr lang="fi-FI" i="1">
+                              <a:latin typeface="Cambria Math" panose="02040503050406030204" pitchFamily="18" charset="0"/>
+                            </a:rPr>
+                            <m:t>𝑖</m:t>
+                          </m:r>
+                          <m:r>
+                            <a:rPr lang="fi-FI" i="0">
+                              <a:latin typeface="Cambria Math" panose="02040503050406030204" pitchFamily="18" charset="0"/>
+                            </a:rPr>
+                            <m:t>=1</m:t>
+                          </m:r>
+                        </m:sub>
+                        <m:sup>
+                          <m:r>
+                            <a:rPr lang="fi-FI" i="1">
+                              <a:latin typeface="Cambria Math" panose="02040503050406030204" pitchFamily="18" charset="0"/>
+                            </a:rPr>
+                            <m:t>𝑚</m:t>
+                          </m:r>
+                        </m:sup>
+                        <m:e>
+                          <m:sSup>
+                            <m:sSupPr>
+                              <m:ctrlPr>
+                                <a:rPr lang="fi-FI" i="1">
+                                  <a:latin typeface="Cambria Math" panose="02040503050406030204" pitchFamily="18" charset="0"/>
+                                </a:rPr>
+                              </m:ctrlPr>
+                            </m:sSupPr>
+                            <m:e>
+                              <m:d>
+                                <m:dPr>
+                                  <m:ctrlPr>
+                                    <a:rPr lang="fi-FI" i="1">
+                                      <a:latin typeface="Cambria Math" panose="02040503050406030204" pitchFamily="18" charset="0"/>
+                                    </a:rPr>
+                                  </m:ctrlPr>
+                                </m:dPr>
+                                <m:e>
+                                  <m:sSub>
+                                    <m:sSubPr>
+                                      <m:ctrlPr>
+                                        <a:rPr lang="fi-FI" i="1">
+                                          <a:latin typeface="Cambria Math" panose="02040503050406030204" pitchFamily="18" charset="0"/>
+                                        </a:rPr>
+                                      </m:ctrlPr>
+                                    </m:sSubPr>
+                                    <m:e>
+                                      <m:r>
+                                        <m:rPr>
+                                          <m:sty m:val="p"/>
+                                        </m:rPr>
+                                        <a:rPr lang="fi-FI">
+                                          <a:latin typeface="Cambria Math" panose="02040503050406030204" pitchFamily="18" charset="0"/>
+                                        </a:rPr>
+                                        <m:t>θ</m:t>
+                                      </m:r>
+                                    </m:e>
+                                    <m:sub>
+                                      <m:r>
+                                        <a:rPr lang="fi-FI">
+                                          <a:latin typeface="Cambria Math" panose="02040503050406030204" pitchFamily="18" charset="0"/>
+                                        </a:rPr>
+                                        <m:t>1</m:t>
+                                      </m:r>
+                                    </m:sub>
+                                  </m:sSub>
+                                  <m:sSup>
+                                    <m:sSupPr>
+                                      <m:ctrlPr>
+                                        <a:rPr lang="fi-FI" i="1" smtClean="0">
+                                          <a:latin typeface="Cambria Math" panose="02040503050406030204" pitchFamily="18" charset="0"/>
+                                        </a:rPr>
+                                      </m:ctrlPr>
+                                    </m:sSupPr>
+                                    <m:e>
+                                      <m:r>
+                                        <a:rPr lang="fi-FI" b="0" i="1" smtClean="0">
+                                          <a:latin typeface="Cambria Math" panose="02040503050406030204" pitchFamily="18" charset="0"/>
+                                        </a:rPr>
+                                        <m:t>𝑥</m:t>
+                                      </m:r>
+                                    </m:e>
+                                    <m:sup>
+                                      <m:r>
+                                        <a:rPr lang="fi-FI" b="0" i="1" smtClean="0">
+                                          <a:latin typeface="Cambria Math" panose="02040503050406030204" pitchFamily="18" charset="0"/>
+                                        </a:rPr>
+                                        <m:t>(</m:t>
+                                      </m:r>
+                                      <m:r>
+                                        <a:rPr lang="fi-FI" b="0" i="1" smtClean="0">
+                                          <a:latin typeface="Cambria Math" panose="02040503050406030204" pitchFamily="18" charset="0"/>
+                                        </a:rPr>
+                                        <m:t>𝑖</m:t>
+                                      </m:r>
+                                      <m:r>
+                                        <a:rPr lang="fi-FI" b="0" i="1" smtClean="0">
+                                          <a:latin typeface="Cambria Math" panose="02040503050406030204" pitchFamily="18" charset="0"/>
+                                        </a:rPr>
+                                        <m:t>)</m:t>
+                                      </m:r>
+                                    </m:sup>
+                                  </m:sSup>
+                                  <m:r>
+                                    <a:rPr lang="fi-FI" b="0" i="1" smtClean="0">
+                                      <a:latin typeface="Cambria Math" panose="02040503050406030204" pitchFamily="18" charset="0"/>
+                                    </a:rPr>
+                                    <m:t>−</m:t>
+                                  </m:r>
+                                  <m:sSup>
+                                    <m:sSupPr>
+                                      <m:ctrlPr>
+                                        <a:rPr lang="fi-FI" b="0" i="1" smtClean="0">
+                                          <a:latin typeface="Cambria Math" panose="02040503050406030204" pitchFamily="18" charset="0"/>
+                                        </a:rPr>
+                                      </m:ctrlPr>
+                                    </m:sSupPr>
+                                    <m:e>
+                                      <m:r>
+                                        <a:rPr lang="fi-FI" b="0" i="1" smtClean="0">
+                                          <a:latin typeface="Cambria Math" panose="02040503050406030204" pitchFamily="18" charset="0"/>
+                                        </a:rPr>
+                                        <m:t>𝑦</m:t>
+                                      </m:r>
+                                    </m:e>
+                                    <m:sup>
+                                      <m:r>
+                                        <a:rPr lang="fi-FI" b="0" i="1" smtClean="0">
+                                          <a:latin typeface="Cambria Math" panose="02040503050406030204" pitchFamily="18" charset="0"/>
+                                        </a:rPr>
+                                        <m:t>(</m:t>
+                                      </m:r>
+                                      <m:r>
+                                        <a:rPr lang="fi-FI" b="0" i="1" smtClean="0">
+                                          <a:latin typeface="Cambria Math" panose="02040503050406030204" pitchFamily="18" charset="0"/>
+                                        </a:rPr>
+                                        <m:t>𝑖</m:t>
+                                      </m:r>
+                                      <m:r>
+                                        <a:rPr lang="fi-FI" b="0" i="1" smtClean="0">
+                                          <a:latin typeface="Cambria Math" panose="02040503050406030204" pitchFamily="18" charset="0"/>
+                                        </a:rPr>
+                                        <m:t>)</m:t>
+                                      </m:r>
+                                    </m:sup>
+                                  </m:sSup>
+                                </m:e>
+                              </m:d>
+                            </m:e>
+                            <m:sup>
+                              <m:r>
+                                <a:rPr lang="fi-FI" i="0">
+                                  <a:latin typeface="Cambria Math" panose="02040503050406030204" pitchFamily="18" charset="0"/>
+                                </a:rPr>
+                                <m:t>2</m:t>
+                              </m:r>
+                            </m:sup>
+                          </m:sSup>
+                        </m:e>
+                      </m:nary>
+                      <m:r>
+                        <a:rPr lang="fi-FI" b="0" i="1" smtClean="0">
+                          <a:latin typeface="Cambria Math" panose="02040503050406030204" pitchFamily="18" charset="0"/>
+                        </a:rPr>
+                        <m:t>= </m:t>
+                      </m:r>
+                      <m:f>
+                        <m:fPr>
+                          <m:ctrlPr>
+                            <a:rPr lang="fi-FI" i="1">
+                              <a:latin typeface="Cambria Math" panose="02040503050406030204" pitchFamily="18" charset="0"/>
+                            </a:rPr>
+                          </m:ctrlPr>
+                        </m:fPr>
+                        <m:num>
+                          <m:r>
+                            <a:rPr lang="fi-FI">
+                              <a:latin typeface="Cambria Math" panose="02040503050406030204" pitchFamily="18" charset="0"/>
+                            </a:rPr>
+                            <m:t>1</m:t>
+                          </m:r>
+                        </m:num>
+                        <m:den>
+                          <m:r>
+                            <a:rPr lang="fi-FI">
+                              <a:latin typeface="Cambria Math" panose="02040503050406030204" pitchFamily="18" charset="0"/>
+                            </a:rPr>
+                            <m:t>2</m:t>
+                          </m:r>
+                          <m:r>
+                            <a:rPr lang="fi-FI" i="1">
+                              <a:latin typeface="Cambria Math" panose="02040503050406030204" pitchFamily="18" charset="0"/>
+                            </a:rPr>
+                            <m:t>𝑚</m:t>
+                          </m:r>
+                        </m:den>
+                      </m:f>
+                      <m:d>
+                        <m:dPr>
+                          <m:ctrlPr>
+                            <a:rPr lang="fi-FI" b="0" i="1" smtClean="0">
+                              <a:latin typeface="Cambria Math" panose="02040503050406030204" pitchFamily="18" charset="0"/>
+                            </a:rPr>
+                          </m:ctrlPr>
+                        </m:dPr>
+                        <m:e>
+                          <m:sSup>
+                            <m:sSupPr>
+                              <m:ctrlPr>
+                                <a:rPr lang="fi-FI" b="0" i="1" smtClean="0">
+                                  <a:latin typeface="Cambria Math" panose="02040503050406030204" pitchFamily="18" charset="0"/>
+                                </a:rPr>
+                              </m:ctrlPr>
+                            </m:sSupPr>
+                            <m:e>
+                              <m:r>
+                                <a:rPr lang="fi-FI" b="0" i="1" smtClean="0">
+                                  <a:latin typeface="Cambria Math" panose="02040503050406030204" pitchFamily="18" charset="0"/>
+                                </a:rPr>
+                                <m:t>(0.5 −1)</m:t>
+                              </m:r>
+                            </m:e>
+                            <m:sup>
+                              <m:r>
+                                <a:rPr lang="fi-FI" b="0" i="1" smtClean="0">
+                                  <a:latin typeface="Cambria Math" panose="02040503050406030204" pitchFamily="18" charset="0"/>
+                                </a:rPr>
+                                <m:t>2</m:t>
+                              </m:r>
+                            </m:sup>
+                          </m:sSup>
+                          <m:r>
+                            <a:rPr lang="fi-FI" b="0" i="1" smtClean="0">
+                              <a:latin typeface="Cambria Math" panose="02040503050406030204" pitchFamily="18" charset="0"/>
+                            </a:rPr>
+                            <m:t>+(</m:t>
+                          </m:r>
+                          <m:sSup>
+                            <m:sSupPr>
+                              <m:ctrlPr>
+                                <a:rPr lang="fi-FI" i="1">
+                                  <a:latin typeface="Cambria Math" panose="02040503050406030204" pitchFamily="18" charset="0"/>
+                                </a:rPr>
+                              </m:ctrlPr>
+                            </m:sSupPr>
+                            <m:e>
+                              <m:r>
+                                <a:rPr lang="fi-FI" b="0" i="1" smtClean="0">
+                                  <a:latin typeface="Cambria Math" panose="02040503050406030204" pitchFamily="18" charset="0"/>
+                                </a:rPr>
+                                <m:t>1 −2</m:t>
+                              </m:r>
+                              <m:r>
+                                <a:rPr lang="fi-FI" b="0" i="1" smtClean="0">
+                                  <a:latin typeface="Cambria Math" panose="02040503050406030204" pitchFamily="18" charset="0"/>
+                                </a:rPr>
+                                <m:t>)</m:t>
+                              </m:r>
+                            </m:e>
+                            <m:sup>
+                              <m:r>
+                                <a:rPr lang="fi-FI" i="1">
+                                  <a:latin typeface="Cambria Math" panose="02040503050406030204" pitchFamily="18" charset="0"/>
+                                </a:rPr>
+                                <m:t>2</m:t>
+                              </m:r>
+                            </m:sup>
+                          </m:sSup>
+                          <m:r>
+                            <a:rPr lang="fi-FI" b="0" i="1" smtClean="0">
+                              <a:latin typeface="Cambria Math" panose="02040503050406030204" pitchFamily="18" charset="0"/>
+                            </a:rPr>
+                            <m:t>+</m:t>
+                          </m:r>
+                          <m:sSup>
+                            <m:sSupPr>
+                              <m:ctrlPr>
+                                <a:rPr lang="fi-FI" i="1">
+                                  <a:latin typeface="Cambria Math" panose="02040503050406030204" pitchFamily="18" charset="0"/>
+                                </a:rPr>
+                              </m:ctrlPr>
+                            </m:sSupPr>
+                            <m:e>
+                              <m:r>
+                                <a:rPr lang="fi-FI" b="0" i="1" smtClean="0">
+                                  <a:latin typeface="Cambria Math" panose="02040503050406030204" pitchFamily="18" charset="0"/>
+                                </a:rPr>
+                                <m:t>(1.5 −3</m:t>
+                              </m:r>
+                              <m:r>
+                                <a:rPr lang="fi-FI" b="0" i="1" smtClean="0">
+                                  <a:latin typeface="Cambria Math" panose="02040503050406030204" pitchFamily="18" charset="0"/>
+                                </a:rPr>
+                                <m:t>)</m:t>
+                              </m:r>
+                            </m:e>
+                            <m:sup>
+                              <m:r>
+                                <a:rPr lang="fi-FI" i="1">
+                                  <a:latin typeface="Cambria Math" panose="02040503050406030204" pitchFamily="18" charset="0"/>
+                                </a:rPr>
+                                <m:t>2</m:t>
+                              </m:r>
+                            </m:sup>
+                          </m:sSup>
+                        </m:e>
+                      </m:d>
+                      <m:r>
+                        <a:rPr lang="fi-FI" b="0" i="1" smtClean="0">
+                          <a:latin typeface="Cambria Math" panose="02040503050406030204" pitchFamily="18" charset="0"/>
+                          <a:ea typeface="Cambria Math" panose="02040503050406030204" pitchFamily="18" charset="0"/>
+                        </a:rPr>
+                        <m:t>≈</m:t>
+                      </m:r>
+                      <m:r>
+                        <a:rPr lang="fi-FI" b="0" i="1" smtClean="0">
+                          <a:latin typeface="Cambria Math" panose="02040503050406030204" pitchFamily="18" charset="0"/>
+                        </a:rPr>
+                        <m:t>0.58</m:t>
+                      </m:r>
+                    </m:oMath>
+                  </m:oMathPara>
+                </a14:m>
+                <a:endParaRPr lang="fi-FI" dirty="0"/>
+              </a:p>
+            </p:txBody>
+          </p:sp>
+        </mc:Choice>
+        <mc:Fallback>
+          <p:sp>
+            <p:nvSpPr>
+              <p:cNvPr id="7" name="Rectangle 6">
+                <a:extLst>
+                  <a:ext uri="{FF2B5EF4-FFF2-40B4-BE49-F238E27FC236}">
+                    <a16:creationId xmlns:a16="http://schemas.microsoft.com/office/drawing/2014/main" id="{37EBA3F8-7318-A145-A098-F5CF2148D748}"/>
+                  </a:ext>
+                </a:extLst>
+              </p:cNvPr>
+              <p:cNvSpPr>
+                <a:spLocks noRot="1" noChangeAspect="1" noMove="1" noResize="1" noEditPoints="1" noAdjustHandles="1" noChangeArrowheads="1" noChangeShapeType="1" noTextEdit="1"/>
+              </p:cNvSpPr>
+              <p:nvPr/>
+            </p:nvSpPr>
+            <p:spPr>
+              <a:xfrm>
+                <a:off x="2035585" y="3690469"/>
+                <a:ext cx="8692829" cy="648639"/>
+              </a:xfrm>
+              <a:prstGeom prst="rect">
+                <a:avLst/>
+              </a:prstGeom>
+              <a:blipFill>
+                <a:blip r:embed="rId5"/>
+                <a:stretch>
+                  <a:fillRect t="-144231" b="-213462"/>
                 </a:stretch>
               </a:blipFill>
             </p:spPr>

</xml_diff>